<commit_message>
r0 plot and figures
</commit_message>
<xml_diff>
--- a/images/present-figs.pptx
+++ b/images/present-figs.pptx
@@ -261,7 +261,7 @@
           <a:p>
             <a:fld id="{F74676E9-EAD9-284B-82D0-DC5EBF4C555C}" type="datetimeFigureOut">
               <a:rPr lang="en-US" smtClean="0"/>
-              <a:t>10/2/19</a:t>
+              <a:t>10/4/19</a:t>
             </a:fld>
             <a:endParaRPr lang="en-US"/>
           </a:p>
@@ -459,7 +459,7 @@
           <a:p>
             <a:fld id="{F74676E9-EAD9-284B-82D0-DC5EBF4C555C}" type="datetimeFigureOut">
               <a:rPr lang="en-US" smtClean="0"/>
-              <a:t>10/2/19</a:t>
+              <a:t>10/4/19</a:t>
             </a:fld>
             <a:endParaRPr lang="en-US"/>
           </a:p>
@@ -667,7 +667,7 @@
           <a:p>
             <a:fld id="{F74676E9-EAD9-284B-82D0-DC5EBF4C555C}" type="datetimeFigureOut">
               <a:rPr lang="en-US" smtClean="0"/>
-              <a:t>10/2/19</a:t>
+              <a:t>10/4/19</a:t>
             </a:fld>
             <a:endParaRPr lang="en-US"/>
           </a:p>
@@ -865,7 +865,7 @@
           <a:p>
             <a:fld id="{F74676E9-EAD9-284B-82D0-DC5EBF4C555C}" type="datetimeFigureOut">
               <a:rPr lang="en-US" smtClean="0"/>
-              <a:t>10/2/19</a:t>
+              <a:t>10/4/19</a:t>
             </a:fld>
             <a:endParaRPr lang="en-US"/>
           </a:p>
@@ -1140,7 +1140,7 @@
           <a:p>
             <a:fld id="{F74676E9-EAD9-284B-82D0-DC5EBF4C555C}" type="datetimeFigureOut">
               <a:rPr lang="en-US" smtClean="0"/>
-              <a:t>10/2/19</a:t>
+              <a:t>10/4/19</a:t>
             </a:fld>
             <a:endParaRPr lang="en-US"/>
           </a:p>
@@ -1405,7 +1405,7 @@
           <a:p>
             <a:fld id="{F74676E9-EAD9-284B-82D0-DC5EBF4C555C}" type="datetimeFigureOut">
               <a:rPr lang="en-US" smtClean="0"/>
-              <a:t>10/2/19</a:t>
+              <a:t>10/4/19</a:t>
             </a:fld>
             <a:endParaRPr lang="en-US"/>
           </a:p>
@@ -1817,7 +1817,7 @@
           <a:p>
             <a:fld id="{F74676E9-EAD9-284B-82D0-DC5EBF4C555C}" type="datetimeFigureOut">
               <a:rPr lang="en-US" smtClean="0"/>
-              <a:t>10/2/19</a:t>
+              <a:t>10/4/19</a:t>
             </a:fld>
             <a:endParaRPr lang="en-US"/>
           </a:p>
@@ -1958,7 +1958,7 @@
           <a:p>
             <a:fld id="{F74676E9-EAD9-284B-82D0-DC5EBF4C555C}" type="datetimeFigureOut">
               <a:rPr lang="en-US" smtClean="0"/>
-              <a:t>10/2/19</a:t>
+              <a:t>10/4/19</a:t>
             </a:fld>
             <a:endParaRPr lang="en-US"/>
           </a:p>
@@ -2071,7 +2071,7 @@
           <a:p>
             <a:fld id="{F74676E9-EAD9-284B-82D0-DC5EBF4C555C}" type="datetimeFigureOut">
               <a:rPr lang="en-US" smtClean="0"/>
-              <a:t>10/2/19</a:t>
+              <a:t>10/4/19</a:t>
             </a:fld>
             <a:endParaRPr lang="en-US"/>
           </a:p>
@@ -2382,7 +2382,7 @@
           <a:p>
             <a:fld id="{F74676E9-EAD9-284B-82D0-DC5EBF4C555C}" type="datetimeFigureOut">
               <a:rPr lang="en-US" smtClean="0"/>
-              <a:t>10/2/19</a:t>
+              <a:t>10/4/19</a:t>
             </a:fld>
             <a:endParaRPr lang="en-US"/>
           </a:p>
@@ -2670,7 +2670,7 @@
           <a:p>
             <a:fld id="{F74676E9-EAD9-284B-82D0-DC5EBF4C555C}" type="datetimeFigureOut">
               <a:rPr lang="en-US" smtClean="0"/>
-              <a:t>10/2/19</a:t>
+              <a:t>10/4/19</a:t>
             </a:fld>
             <a:endParaRPr lang="en-US"/>
           </a:p>
@@ -2911,7 +2911,7 @@
           <a:p>
             <a:fld id="{F74676E9-EAD9-284B-82D0-DC5EBF4C555C}" type="datetimeFigureOut">
               <a:rPr lang="en-US" smtClean="0"/>
-              <a:t>10/2/19</a:t>
+              <a:t>10/4/19</a:t>
             </a:fld>
             <a:endParaRPr lang="en-US"/>
           </a:p>
@@ -8373,10 +8373,10 @@
       </p:grpSpPr>
       <p:grpSp>
         <p:nvGrpSpPr>
-          <p:cNvPr id="10" name="Group 9">
+          <p:cNvPr id="2" name="Group 1">
             <a:extLst>
               <a:ext uri="{FF2B5EF4-FFF2-40B4-BE49-F238E27FC236}">
-                <a16:creationId xmlns:a16="http://schemas.microsoft.com/office/drawing/2014/main" id="{B4985A31-1F74-E245-A439-326D52D51002}"/>
+                <a16:creationId xmlns:a16="http://schemas.microsoft.com/office/drawing/2014/main" id="{C2457C26-2A1E-444C-8328-2986B44F4C93}"/>
               </a:ext>
             </a:extLst>
           </p:cNvPr>
@@ -8391,245 +8391,266 @@
             <a:chExt cx="6610358" cy="5508624"/>
           </a:xfrm>
         </p:grpSpPr>
-        <p:sp>
-          <p:nvSpPr>
-            <p:cNvPr id="9" name="Rectangle 8">
+        <p:grpSp>
+          <p:nvGrpSpPr>
+            <p:cNvPr id="10" name="Group 9">
               <a:extLst>
                 <a:ext uri="{FF2B5EF4-FFF2-40B4-BE49-F238E27FC236}">
-                  <a16:creationId xmlns:a16="http://schemas.microsoft.com/office/drawing/2014/main" id="{C695FD4A-A2DD-9742-AFCA-1418D43E3DE7}"/>
+                  <a16:creationId xmlns:a16="http://schemas.microsoft.com/office/drawing/2014/main" id="{B4985A31-1F74-E245-A439-326D52D51002}"/>
                 </a:ext>
               </a:extLst>
             </p:cNvPr>
-            <p:cNvSpPr/>
+            <p:cNvGrpSpPr/>
             <p:nvPr/>
-          </p:nvSpPr>
+          </p:nvGrpSpPr>
+          <p:grpSpPr>
+            <a:xfrm>
+              <a:off x="2714626" y="688976"/>
+              <a:ext cx="6610358" cy="5508624"/>
+              <a:chOff x="2714626" y="688976"/>
+              <a:chExt cx="6610358" cy="5508624"/>
+            </a:xfrm>
+          </p:grpSpPr>
+          <p:sp>
+            <p:nvSpPr>
+              <p:cNvPr id="9" name="Rectangle 8">
+                <a:extLst>
+                  <a:ext uri="{FF2B5EF4-FFF2-40B4-BE49-F238E27FC236}">
+                    <a16:creationId xmlns:a16="http://schemas.microsoft.com/office/drawing/2014/main" id="{C695FD4A-A2DD-9742-AFCA-1418D43E3DE7}"/>
+                  </a:ext>
+                </a:extLst>
+              </p:cNvPr>
+              <p:cNvSpPr/>
+              <p:nvPr/>
+            </p:nvSpPr>
+            <p:spPr>
+              <a:xfrm>
+                <a:off x="6030916" y="3486150"/>
+                <a:ext cx="3294068" cy="2711450"/>
+              </a:xfrm>
+              <a:prstGeom prst="rect">
+                <a:avLst/>
+              </a:prstGeom>
+              <a:solidFill>
+                <a:srgbClr val="6B4F99"/>
+              </a:solidFill>
+              <a:ln>
+                <a:noFill/>
+              </a:ln>
+            </p:spPr>
+            <p:style>
+              <a:lnRef idx="2">
+                <a:schemeClr val="accent1">
+                  <a:shade val="50000"/>
+                </a:schemeClr>
+              </a:lnRef>
+              <a:fillRef idx="1">
+                <a:schemeClr val="accent1"/>
+              </a:fillRef>
+              <a:effectRef idx="0">
+                <a:schemeClr val="accent1"/>
+              </a:effectRef>
+              <a:fontRef idx="minor">
+                <a:schemeClr val="lt1"/>
+              </a:fontRef>
+            </p:style>
+            <p:txBody>
+              <a:bodyPr rtlCol="0" anchor="ctr"/>
+              <a:lstStyle/>
+              <a:p>
+                <a:pPr algn="ctr"/>
+                <a:endParaRPr lang="en-US"/>
+              </a:p>
+            </p:txBody>
+          </p:sp>
+          <p:sp>
+            <p:nvSpPr>
+              <p:cNvPr id="8" name="Rectangle 7">
+                <a:extLst>
+                  <a:ext uri="{FF2B5EF4-FFF2-40B4-BE49-F238E27FC236}">
+                    <a16:creationId xmlns:a16="http://schemas.microsoft.com/office/drawing/2014/main" id="{C6F72EB2-5EAA-3E41-A8D6-C751D1E80F60}"/>
+                  </a:ext>
+                </a:extLst>
+              </p:cNvPr>
+              <p:cNvSpPr/>
+              <p:nvPr/>
+            </p:nvSpPr>
+            <p:spPr>
+              <a:xfrm>
+                <a:off x="2714626" y="3486150"/>
+                <a:ext cx="3316290" cy="2711450"/>
+              </a:xfrm>
+              <a:prstGeom prst="rect">
+                <a:avLst/>
+              </a:prstGeom>
+              <a:solidFill>
+                <a:srgbClr val="C069A3"/>
+              </a:solidFill>
+              <a:ln>
+                <a:noFill/>
+              </a:ln>
+            </p:spPr>
+            <p:style>
+              <a:lnRef idx="2">
+                <a:schemeClr val="accent1">
+                  <a:shade val="50000"/>
+                </a:schemeClr>
+              </a:lnRef>
+              <a:fillRef idx="1">
+                <a:schemeClr val="accent1"/>
+              </a:fillRef>
+              <a:effectRef idx="0">
+                <a:schemeClr val="accent1"/>
+              </a:effectRef>
+              <a:fontRef idx="minor">
+                <a:schemeClr val="lt1"/>
+              </a:fontRef>
+            </p:style>
+            <p:txBody>
+              <a:bodyPr rtlCol="0" anchor="ctr"/>
+              <a:lstStyle/>
+              <a:p>
+                <a:pPr algn="ctr"/>
+                <a:endParaRPr lang="en-US"/>
+              </a:p>
+            </p:txBody>
+          </p:sp>
+          <p:sp>
+            <p:nvSpPr>
+              <p:cNvPr id="7" name="Rectangle 6">
+                <a:extLst>
+                  <a:ext uri="{FF2B5EF4-FFF2-40B4-BE49-F238E27FC236}">
+                    <a16:creationId xmlns:a16="http://schemas.microsoft.com/office/drawing/2014/main" id="{588E58FC-FE3E-4E42-8CCA-6729DBD2BE9C}"/>
+                  </a:ext>
+                </a:extLst>
+              </p:cNvPr>
+              <p:cNvSpPr/>
+              <p:nvPr/>
+            </p:nvSpPr>
+            <p:spPr>
+              <a:xfrm>
+                <a:off x="6030916" y="688976"/>
+                <a:ext cx="3294068" cy="2797174"/>
+              </a:xfrm>
+              <a:prstGeom prst="rect">
+                <a:avLst/>
+              </a:prstGeom>
+              <a:solidFill>
+                <a:srgbClr val="EAA48B"/>
+              </a:solidFill>
+              <a:ln>
+                <a:noFill/>
+              </a:ln>
+            </p:spPr>
+            <p:style>
+              <a:lnRef idx="2">
+                <a:schemeClr val="accent1">
+                  <a:shade val="50000"/>
+                </a:schemeClr>
+              </a:lnRef>
+              <a:fillRef idx="1">
+                <a:schemeClr val="accent1"/>
+              </a:fillRef>
+              <a:effectRef idx="0">
+                <a:schemeClr val="accent1"/>
+              </a:effectRef>
+              <a:fontRef idx="minor">
+                <a:schemeClr val="lt1"/>
+              </a:fontRef>
+            </p:style>
+            <p:txBody>
+              <a:bodyPr rtlCol="0" anchor="ctr"/>
+              <a:lstStyle/>
+              <a:p>
+                <a:pPr algn="ctr"/>
+                <a:endParaRPr lang="en-US"/>
+              </a:p>
+            </p:txBody>
+          </p:sp>
+          <p:sp>
+            <p:nvSpPr>
+              <p:cNvPr id="6" name="Rectangle 5">
+                <a:extLst>
+                  <a:ext uri="{FF2B5EF4-FFF2-40B4-BE49-F238E27FC236}">
+                    <a16:creationId xmlns:a16="http://schemas.microsoft.com/office/drawing/2014/main" id="{51470D7A-8785-2049-ACB1-3A995CDBF5C9}"/>
+                  </a:ext>
+                </a:extLst>
+              </p:cNvPr>
+              <p:cNvSpPr/>
+              <p:nvPr/>
+            </p:nvSpPr>
+            <p:spPr>
+              <a:xfrm>
+                <a:off x="2714626" y="688976"/>
+                <a:ext cx="3316290" cy="2797174"/>
+              </a:xfrm>
+              <a:prstGeom prst="rect">
+                <a:avLst/>
+              </a:prstGeom>
+              <a:solidFill>
+                <a:srgbClr val="F1E7A3"/>
+              </a:solidFill>
+              <a:ln>
+                <a:noFill/>
+              </a:ln>
+            </p:spPr>
+            <p:style>
+              <a:lnRef idx="2">
+                <a:schemeClr val="accent1">
+                  <a:shade val="50000"/>
+                </a:schemeClr>
+              </a:lnRef>
+              <a:fillRef idx="1">
+                <a:schemeClr val="accent1"/>
+              </a:fillRef>
+              <a:effectRef idx="0">
+                <a:schemeClr val="accent1"/>
+              </a:effectRef>
+              <a:fontRef idx="minor">
+                <a:schemeClr val="lt1"/>
+              </a:fontRef>
+            </p:style>
+            <p:txBody>
+              <a:bodyPr rtlCol="0" anchor="ctr"/>
+              <a:lstStyle/>
+              <a:p>
+                <a:pPr algn="ctr"/>
+                <a:endParaRPr lang="en-US"/>
+              </a:p>
+            </p:txBody>
+          </p:sp>
+        </p:grpSp>
+        <p:pic>
+          <p:nvPicPr>
+            <p:cNvPr id="16" name="Picture 15">
+              <a:extLst>
+                <a:ext uri="{FF2B5EF4-FFF2-40B4-BE49-F238E27FC236}">
+                  <a16:creationId xmlns:a16="http://schemas.microsoft.com/office/drawing/2014/main" id="{3D26BE75-FEFA-6B43-B15C-2944A612BF46}"/>
+                </a:ext>
+              </a:extLst>
+            </p:cNvPr>
+            <p:cNvPicPr>
+              <a:picLocks noChangeAspect="1"/>
+            </p:cNvPicPr>
+            <p:nvPr/>
+          </p:nvPicPr>
+          <p:blipFill>
+            <a:blip r:embed="rId2"/>
+            <a:stretch>
+              <a:fillRect/>
+            </a:stretch>
+          </p:blipFill>
           <p:spPr>
             <a:xfrm>
-              <a:off x="6030916" y="3486150"/>
-              <a:ext cx="3294068" cy="2711450"/>
+              <a:off x="2984500" y="774700"/>
+              <a:ext cx="6223000" cy="5308600"/>
             </a:xfrm>
             <a:prstGeom prst="rect">
               <a:avLst/>
             </a:prstGeom>
-            <a:solidFill>
-              <a:srgbClr val="6B4F99"/>
-            </a:solidFill>
-            <a:ln>
-              <a:noFill/>
-            </a:ln>
           </p:spPr>
-          <p:style>
-            <a:lnRef idx="2">
-              <a:schemeClr val="accent1">
-                <a:shade val="50000"/>
-              </a:schemeClr>
-            </a:lnRef>
-            <a:fillRef idx="1">
-              <a:schemeClr val="accent1"/>
-            </a:fillRef>
-            <a:effectRef idx="0">
-              <a:schemeClr val="accent1"/>
-            </a:effectRef>
-            <a:fontRef idx="minor">
-              <a:schemeClr val="lt1"/>
-            </a:fontRef>
-          </p:style>
-          <p:txBody>
-            <a:bodyPr rtlCol="0" anchor="ctr"/>
-            <a:lstStyle/>
-            <a:p>
-              <a:pPr algn="ctr"/>
-              <a:endParaRPr lang="en-US"/>
-            </a:p>
-          </p:txBody>
-        </p:sp>
-        <p:sp>
-          <p:nvSpPr>
-            <p:cNvPr id="8" name="Rectangle 7">
-              <a:extLst>
-                <a:ext uri="{FF2B5EF4-FFF2-40B4-BE49-F238E27FC236}">
-                  <a16:creationId xmlns:a16="http://schemas.microsoft.com/office/drawing/2014/main" id="{C6F72EB2-5EAA-3E41-A8D6-C751D1E80F60}"/>
-                </a:ext>
-              </a:extLst>
-            </p:cNvPr>
-            <p:cNvSpPr/>
-            <p:nvPr/>
-          </p:nvSpPr>
-          <p:spPr>
-            <a:xfrm>
-              <a:off x="2714626" y="3486150"/>
-              <a:ext cx="3316290" cy="2711450"/>
-            </a:xfrm>
-            <a:prstGeom prst="rect">
-              <a:avLst/>
-            </a:prstGeom>
-            <a:solidFill>
-              <a:srgbClr val="C069A3"/>
-            </a:solidFill>
-            <a:ln>
-              <a:noFill/>
-            </a:ln>
-          </p:spPr>
-          <p:style>
-            <a:lnRef idx="2">
-              <a:schemeClr val="accent1">
-                <a:shade val="50000"/>
-              </a:schemeClr>
-            </a:lnRef>
-            <a:fillRef idx="1">
-              <a:schemeClr val="accent1"/>
-            </a:fillRef>
-            <a:effectRef idx="0">
-              <a:schemeClr val="accent1"/>
-            </a:effectRef>
-            <a:fontRef idx="minor">
-              <a:schemeClr val="lt1"/>
-            </a:fontRef>
-          </p:style>
-          <p:txBody>
-            <a:bodyPr rtlCol="0" anchor="ctr"/>
-            <a:lstStyle/>
-            <a:p>
-              <a:pPr algn="ctr"/>
-              <a:endParaRPr lang="en-US"/>
-            </a:p>
-          </p:txBody>
-        </p:sp>
-        <p:sp>
-          <p:nvSpPr>
-            <p:cNvPr id="7" name="Rectangle 6">
-              <a:extLst>
-                <a:ext uri="{FF2B5EF4-FFF2-40B4-BE49-F238E27FC236}">
-                  <a16:creationId xmlns:a16="http://schemas.microsoft.com/office/drawing/2014/main" id="{588E58FC-FE3E-4E42-8CCA-6729DBD2BE9C}"/>
-                </a:ext>
-              </a:extLst>
-            </p:cNvPr>
-            <p:cNvSpPr/>
-            <p:nvPr/>
-          </p:nvSpPr>
-          <p:spPr>
-            <a:xfrm>
-              <a:off x="6030916" y="688976"/>
-              <a:ext cx="3294068" cy="2797174"/>
-            </a:xfrm>
-            <a:prstGeom prst="rect">
-              <a:avLst/>
-            </a:prstGeom>
-            <a:solidFill>
-              <a:srgbClr val="EAA48B"/>
-            </a:solidFill>
-            <a:ln>
-              <a:noFill/>
-            </a:ln>
-          </p:spPr>
-          <p:style>
-            <a:lnRef idx="2">
-              <a:schemeClr val="accent1">
-                <a:shade val="50000"/>
-              </a:schemeClr>
-            </a:lnRef>
-            <a:fillRef idx="1">
-              <a:schemeClr val="accent1"/>
-            </a:fillRef>
-            <a:effectRef idx="0">
-              <a:schemeClr val="accent1"/>
-            </a:effectRef>
-            <a:fontRef idx="minor">
-              <a:schemeClr val="lt1"/>
-            </a:fontRef>
-          </p:style>
-          <p:txBody>
-            <a:bodyPr rtlCol="0" anchor="ctr"/>
-            <a:lstStyle/>
-            <a:p>
-              <a:pPr algn="ctr"/>
-              <a:endParaRPr lang="en-US"/>
-            </a:p>
-          </p:txBody>
-        </p:sp>
-        <p:sp>
-          <p:nvSpPr>
-            <p:cNvPr id="6" name="Rectangle 5">
-              <a:extLst>
-                <a:ext uri="{FF2B5EF4-FFF2-40B4-BE49-F238E27FC236}">
-                  <a16:creationId xmlns:a16="http://schemas.microsoft.com/office/drawing/2014/main" id="{51470D7A-8785-2049-ACB1-3A995CDBF5C9}"/>
-                </a:ext>
-              </a:extLst>
-            </p:cNvPr>
-            <p:cNvSpPr/>
-            <p:nvPr/>
-          </p:nvSpPr>
-          <p:spPr>
-            <a:xfrm>
-              <a:off x="2714626" y="688976"/>
-              <a:ext cx="3316290" cy="2797174"/>
-            </a:xfrm>
-            <a:prstGeom prst="rect">
-              <a:avLst/>
-            </a:prstGeom>
-            <a:solidFill>
-              <a:srgbClr val="F1E7A3"/>
-            </a:solidFill>
-            <a:ln>
-              <a:noFill/>
-            </a:ln>
-          </p:spPr>
-          <p:style>
-            <a:lnRef idx="2">
-              <a:schemeClr val="accent1">
-                <a:shade val="50000"/>
-              </a:schemeClr>
-            </a:lnRef>
-            <a:fillRef idx="1">
-              <a:schemeClr val="accent1"/>
-            </a:fillRef>
-            <a:effectRef idx="0">
-              <a:schemeClr val="accent1"/>
-            </a:effectRef>
-            <a:fontRef idx="minor">
-              <a:schemeClr val="lt1"/>
-            </a:fontRef>
-          </p:style>
-          <p:txBody>
-            <a:bodyPr rtlCol="0" anchor="ctr"/>
-            <a:lstStyle/>
-            <a:p>
-              <a:pPr algn="ctr"/>
-              <a:endParaRPr lang="en-US"/>
-            </a:p>
-          </p:txBody>
-        </p:sp>
+        </p:pic>
       </p:grpSp>
-      <p:pic>
-        <p:nvPicPr>
-          <p:cNvPr id="16" name="Picture 15">
-            <a:extLst>
-              <a:ext uri="{FF2B5EF4-FFF2-40B4-BE49-F238E27FC236}">
-                <a16:creationId xmlns:a16="http://schemas.microsoft.com/office/drawing/2014/main" id="{3D26BE75-FEFA-6B43-B15C-2944A612BF46}"/>
-              </a:ext>
-            </a:extLst>
-          </p:cNvPr>
-          <p:cNvPicPr>
-            <a:picLocks noChangeAspect="1"/>
-          </p:cNvPicPr>
-          <p:nvPr/>
-        </p:nvPicPr>
-        <p:blipFill>
-          <a:blip r:embed="rId2"/>
-          <a:stretch>
-            <a:fillRect/>
-          </a:stretch>
-        </p:blipFill>
-        <p:spPr>
-          <a:xfrm>
-            <a:off x="2984500" y="774700"/>
-            <a:ext cx="6223000" cy="5308600"/>
-          </a:xfrm>
-          <a:prstGeom prst="rect">
-            <a:avLst/>
-          </a:prstGeom>
-        </p:spPr>
-      </p:pic>
     </p:spTree>
     <p:extLst>
       <p:ext uri="{BB962C8B-B14F-4D97-AF65-F5344CB8AC3E}">

</xml_diff>

<commit_message>
latent period v prev ltbi
</commit_message>
<xml_diff>
--- a/images/present-figs.pptx
+++ b/images/present-figs.pptx
@@ -8,6 +8,8 @@
     <p:sldId id="256" r:id="rId2"/>
     <p:sldId id="257" r:id="rId3"/>
     <p:sldId id="258" r:id="rId4"/>
+    <p:sldId id="259" r:id="rId5"/>
+    <p:sldId id="260" r:id="rId6"/>
   </p:sldIdLst>
   <p:sldSz cx="12192000" cy="6858000"/>
   <p:notesSz cx="6858000" cy="9144000"/>
@@ -8664,6 +8666,1861 @@
 </p:sld>
 </file>
 
+<file path=ppt/slides/slide4.xml><?xml version="1.0" encoding="utf-8"?>
+<p:sld xmlns:a="http://schemas.openxmlformats.org/drawingml/2006/main" xmlns:r="http://schemas.openxmlformats.org/officeDocument/2006/relationships" xmlns:p="http://schemas.openxmlformats.org/presentationml/2006/main">
+  <p:cSld>
+    <p:spTree>
+      <p:nvGrpSpPr>
+        <p:cNvPr id="1" name=""/>
+        <p:cNvGrpSpPr/>
+        <p:nvPr/>
+      </p:nvGrpSpPr>
+      <p:grpSpPr>
+        <a:xfrm>
+          <a:off x="0" y="0"/>
+          <a:ext cx="0" cy="0"/>
+          <a:chOff x="0" y="0"/>
+          <a:chExt cx="0" cy="0"/>
+        </a:xfrm>
+      </p:grpSpPr>
+      <p:grpSp>
+        <p:nvGrpSpPr>
+          <p:cNvPr id="10" name="Group 9">
+            <a:extLst>
+              <a:ext uri="{FF2B5EF4-FFF2-40B4-BE49-F238E27FC236}">
+                <a16:creationId xmlns:a16="http://schemas.microsoft.com/office/drawing/2014/main" id="{EFB80634-539F-284B-9067-7164E56514C3}"/>
+              </a:ext>
+            </a:extLst>
+          </p:cNvPr>
+          <p:cNvGrpSpPr/>
+          <p:nvPr/>
+        </p:nvGrpSpPr>
+        <p:grpSpPr>
+          <a:xfrm>
+            <a:off x="1809751" y="385763"/>
+            <a:ext cx="2928937" cy="2443163"/>
+            <a:chOff x="1271588" y="914400"/>
+            <a:chExt cx="2371725" cy="1528763"/>
+          </a:xfrm>
+        </p:grpSpPr>
+        <p:cxnSp>
+          <p:nvCxnSpPr>
+            <p:cNvPr id="5" name="Straight Connector 4">
+              <a:extLst>
+                <a:ext uri="{FF2B5EF4-FFF2-40B4-BE49-F238E27FC236}">
+                  <a16:creationId xmlns:a16="http://schemas.microsoft.com/office/drawing/2014/main" id="{2A849A9B-21B2-684B-8B88-0A9A3A93D47F}"/>
+                </a:ext>
+              </a:extLst>
+            </p:cNvPr>
+            <p:cNvCxnSpPr/>
+            <p:nvPr/>
+          </p:nvCxnSpPr>
+          <p:spPr>
+            <a:xfrm>
+              <a:off x="1271588" y="914400"/>
+              <a:ext cx="0" cy="1528763"/>
+            </a:xfrm>
+            <a:prstGeom prst="line">
+              <a:avLst/>
+            </a:prstGeom>
+          </p:spPr>
+          <p:style>
+            <a:lnRef idx="1">
+              <a:schemeClr val="dk1"/>
+            </a:lnRef>
+            <a:fillRef idx="0">
+              <a:schemeClr val="dk1"/>
+            </a:fillRef>
+            <a:effectRef idx="0">
+              <a:schemeClr val="dk1"/>
+            </a:effectRef>
+            <a:fontRef idx="minor">
+              <a:schemeClr val="tx1"/>
+            </a:fontRef>
+          </p:style>
+        </p:cxnSp>
+        <p:cxnSp>
+          <p:nvCxnSpPr>
+            <p:cNvPr id="6" name="Straight Connector 5">
+              <a:extLst>
+                <a:ext uri="{FF2B5EF4-FFF2-40B4-BE49-F238E27FC236}">
+                  <a16:creationId xmlns:a16="http://schemas.microsoft.com/office/drawing/2014/main" id="{A08D4BAE-4D68-EB4C-B48A-0D056337CBFE}"/>
+                </a:ext>
+              </a:extLst>
+            </p:cNvPr>
+            <p:cNvCxnSpPr>
+              <a:cxnSpLocks/>
+            </p:cNvCxnSpPr>
+            <p:nvPr/>
+          </p:nvCxnSpPr>
+          <p:spPr>
+            <a:xfrm flipH="1">
+              <a:off x="1271588" y="2443163"/>
+              <a:ext cx="2371725" cy="0"/>
+            </a:xfrm>
+            <a:prstGeom prst="line">
+              <a:avLst/>
+            </a:prstGeom>
+          </p:spPr>
+          <p:style>
+            <a:lnRef idx="1">
+              <a:schemeClr val="dk1"/>
+            </a:lnRef>
+            <a:fillRef idx="0">
+              <a:schemeClr val="dk1"/>
+            </a:fillRef>
+            <a:effectRef idx="0">
+              <a:schemeClr val="dk1"/>
+            </a:effectRef>
+            <a:fontRef idx="minor">
+              <a:schemeClr val="tx1"/>
+            </a:fontRef>
+          </p:style>
+        </p:cxnSp>
+      </p:grpSp>
+      <p:grpSp>
+        <p:nvGrpSpPr>
+          <p:cNvPr id="11" name="Group 10">
+            <a:extLst>
+              <a:ext uri="{FF2B5EF4-FFF2-40B4-BE49-F238E27FC236}">
+                <a16:creationId xmlns:a16="http://schemas.microsoft.com/office/drawing/2014/main" id="{B1CBDB6F-53FA-1A40-9230-257D005559AD}"/>
+              </a:ext>
+            </a:extLst>
+          </p:cNvPr>
+          <p:cNvGrpSpPr/>
+          <p:nvPr/>
+        </p:nvGrpSpPr>
+        <p:grpSpPr>
+          <a:xfrm>
+            <a:off x="1809751" y="3395663"/>
+            <a:ext cx="2928937" cy="2443163"/>
+            <a:chOff x="1271588" y="914400"/>
+            <a:chExt cx="2371725" cy="1528763"/>
+          </a:xfrm>
+        </p:grpSpPr>
+        <p:cxnSp>
+          <p:nvCxnSpPr>
+            <p:cNvPr id="12" name="Straight Connector 11">
+              <a:extLst>
+                <a:ext uri="{FF2B5EF4-FFF2-40B4-BE49-F238E27FC236}">
+                  <a16:creationId xmlns:a16="http://schemas.microsoft.com/office/drawing/2014/main" id="{32CBD797-921D-7D4E-A719-9B27CE6E32DC}"/>
+                </a:ext>
+              </a:extLst>
+            </p:cNvPr>
+            <p:cNvCxnSpPr/>
+            <p:nvPr/>
+          </p:nvCxnSpPr>
+          <p:spPr>
+            <a:xfrm>
+              <a:off x="1271588" y="914400"/>
+              <a:ext cx="0" cy="1528763"/>
+            </a:xfrm>
+            <a:prstGeom prst="line">
+              <a:avLst/>
+            </a:prstGeom>
+          </p:spPr>
+          <p:style>
+            <a:lnRef idx="1">
+              <a:schemeClr val="dk1"/>
+            </a:lnRef>
+            <a:fillRef idx="0">
+              <a:schemeClr val="dk1"/>
+            </a:fillRef>
+            <a:effectRef idx="0">
+              <a:schemeClr val="dk1"/>
+            </a:effectRef>
+            <a:fontRef idx="minor">
+              <a:schemeClr val="tx1"/>
+            </a:fontRef>
+          </p:style>
+        </p:cxnSp>
+        <p:cxnSp>
+          <p:nvCxnSpPr>
+            <p:cNvPr id="13" name="Straight Connector 12">
+              <a:extLst>
+                <a:ext uri="{FF2B5EF4-FFF2-40B4-BE49-F238E27FC236}">
+                  <a16:creationId xmlns:a16="http://schemas.microsoft.com/office/drawing/2014/main" id="{3AE6C637-E1FC-C346-BCB8-99C38809B4B2}"/>
+                </a:ext>
+              </a:extLst>
+            </p:cNvPr>
+            <p:cNvCxnSpPr>
+              <a:cxnSpLocks/>
+            </p:cNvCxnSpPr>
+            <p:nvPr/>
+          </p:nvCxnSpPr>
+          <p:spPr>
+            <a:xfrm flipH="1">
+              <a:off x="1271588" y="2443163"/>
+              <a:ext cx="2371725" cy="0"/>
+            </a:xfrm>
+            <a:prstGeom prst="line">
+              <a:avLst/>
+            </a:prstGeom>
+          </p:spPr>
+          <p:style>
+            <a:lnRef idx="1">
+              <a:schemeClr val="dk1"/>
+            </a:lnRef>
+            <a:fillRef idx="0">
+              <a:schemeClr val="dk1"/>
+            </a:fillRef>
+            <a:effectRef idx="0">
+              <a:schemeClr val="dk1"/>
+            </a:effectRef>
+            <a:fontRef idx="minor">
+              <a:schemeClr val="tx1"/>
+            </a:fontRef>
+          </p:style>
+        </p:cxnSp>
+      </p:grpSp>
+      <p:sp>
+        <p:nvSpPr>
+          <p:cNvPr id="14" name="TextBox 13">
+            <a:extLst>
+              <a:ext uri="{FF2B5EF4-FFF2-40B4-BE49-F238E27FC236}">
+                <a16:creationId xmlns:a16="http://schemas.microsoft.com/office/drawing/2014/main" id="{94696569-CC45-C64B-87B6-45DE264B8705}"/>
+              </a:ext>
+            </a:extLst>
+          </p:cNvPr>
+          <p:cNvSpPr txBox="1"/>
+          <p:nvPr/>
+        </p:nvSpPr>
+        <p:spPr>
+          <a:xfrm>
+            <a:off x="3004113" y="6372225"/>
+            <a:ext cx="540212" cy="369332"/>
+          </a:xfrm>
+          <a:prstGeom prst="rect">
+            <a:avLst/>
+          </a:prstGeom>
+          <a:noFill/>
+        </p:spPr>
+        <p:txBody>
+          <a:bodyPr wrap="none" rtlCol="0">
+            <a:spAutoFit/>
+          </a:bodyPr>
+          <a:lstStyle/>
+          <a:p>
+            <a:r>
+              <a:rPr lang="en-US" dirty="0"/>
+              <a:t>Age</a:t>
+            </a:r>
+          </a:p>
+        </p:txBody>
+      </p:sp>
+      <p:sp>
+        <p:nvSpPr>
+          <p:cNvPr id="15" name="TextBox 14">
+            <a:extLst>
+              <a:ext uri="{FF2B5EF4-FFF2-40B4-BE49-F238E27FC236}">
+                <a16:creationId xmlns:a16="http://schemas.microsoft.com/office/drawing/2014/main" id="{D8C31E45-A680-8A45-9045-92CBC8E15CC1}"/>
+              </a:ext>
+            </a:extLst>
+          </p:cNvPr>
+          <p:cNvSpPr txBox="1"/>
+          <p:nvPr/>
+        </p:nvSpPr>
+        <p:spPr>
+          <a:xfrm rot="16200000">
+            <a:off x="191257" y="2754527"/>
+            <a:ext cx="1980286" cy="369332"/>
+          </a:xfrm>
+          <a:prstGeom prst="rect">
+            <a:avLst/>
+          </a:prstGeom>
+          <a:noFill/>
+        </p:spPr>
+        <p:txBody>
+          <a:bodyPr wrap="none" rtlCol="0">
+            <a:spAutoFit/>
+          </a:bodyPr>
+          <a:lstStyle/>
+          <a:p>
+            <a:r>
+              <a:rPr lang="en-US" dirty="0"/>
+              <a:t>Amount of sex-bias</a:t>
+            </a:r>
+          </a:p>
+        </p:txBody>
+      </p:sp>
+      <p:sp>
+        <p:nvSpPr>
+          <p:cNvPr id="19" name="Freeform 18">
+            <a:extLst>
+              <a:ext uri="{FF2B5EF4-FFF2-40B4-BE49-F238E27FC236}">
+                <a16:creationId xmlns:a16="http://schemas.microsoft.com/office/drawing/2014/main" id="{507B1792-90FA-D44B-81D0-F2C029207E53}"/>
+              </a:ext>
+            </a:extLst>
+          </p:cNvPr>
+          <p:cNvSpPr/>
+          <p:nvPr/>
+        </p:nvSpPr>
+        <p:spPr>
+          <a:xfrm>
+            <a:off x="1828800" y="1485900"/>
+            <a:ext cx="2571750" cy="1328738"/>
+          </a:xfrm>
+          <a:custGeom>
+            <a:avLst/>
+            <a:gdLst>
+              <a:gd name="connsiteX0" fmla="*/ 0 w 2571750"/>
+              <a:gd name="connsiteY0" fmla="*/ 314325 h 1328738"/>
+              <a:gd name="connsiteX1" fmla="*/ 14288 w 2571750"/>
+              <a:gd name="connsiteY1" fmla="*/ 371475 h 1328738"/>
+              <a:gd name="connsiteX2" fmla="*/ 42863 w 2571750"/>
+              <a:gd name="connsiteY2" fmla="*/ 457200 h 1328738"/>
+              <a:gd name="connsiteX3" fmla="*/ 57150 w 2571750"/>
+              <a:gd name="connsiteY3" fmla="*/ 500063 h 1328738"/>
+              <a:gd name="connsiteX4" fmla="*/ 71438 w 2571750"/>
+              <a:gd name="connsiteY4" fmla="*/ 542925 h 1328738"/>
+              <a:gd name="connsiteX5" fmla="*/ 85725 w 2571750"/>
+              <a:gd name="connsiteY5" fmla="*/ 585788 h 1328738"/>
+              <a:gd name="connsiteX6" fmla="*/ 100013 w 2571750"/>
+              <a:gd name="connsiteY6" fmla="*/ 685800 h 1328738"/>
+              <a:gd name="connsiteX7" fmla="*/ 128588 w 2571750"/>
+              <a:gd name="connsiteY7" fmla="*/ 771525 h 1328738"/>
+              <a:gd name="connsiteX8" fmla="*/ 142875 w 2571750"/>
+              <a:gd name="connsiteY8" fmla="*/ 828675 h 1328738"/>
+              <a:gd name="connsiteX9" fmla="*/ 171450 w 2571750"/>
+              <a:gd name="connsiteY9" fmla="*/ 957263 h 1328738"/>
+              <a:gd name="connsiteX10" fmla="*/ 214313 w 2571750"/>
+              <a:gd name="connsiteY10" fmla="*/ 1085850 h 1328738"/>
+              <a:gd name="connsiteX11" fmla="*/ 228600 w 2571750"/>
+              <a:gd name="connsiteY11" fmla="*/ 1128713 h 1328738"/>
+              <a:gd name="connsiteX12" fmla="*/ 271463 w 2571750"/>
+              <a:gd name="connsiteY12" fmla="*/ 1157288 h 1328738"/>
+              <a:gd name="connsiteX13" fmla="*/ 414338 w 2571750"/>
+              <a:gd name="connsiteY13" fmla="*/ 1200150 h 1328738"/>
+              <a:gd name="connsiteX14" fmla="*/ 500063 w 2571750"/>
+              <a:gd name="connsiteY14" fmla="*/ 1228725 h 1328738"/>
+              <a:gd name="connsiteX15" fmla="*/ 628650 w 2571750"/>
+              <a:gd name="connsiteY15" fmla="*/ 1285875 h 1328738"/>
+              <a:gd name="connsiteX16" fmla="*/ 714375 w 2571750"/>
+              <a:gd name="connsiteY16" fmla="*/ 1314450 h 1328738"/>
+              <a:gd name="connsiteX17" fmla="*/ 842963 w 2571750"/>
+              <a:gd name="connsiteY17" fmla="*/ 1328738 h 1328738"/>
+              <a:gd name="connsiteX18" fmla="*/ 871538 w 2571750"/>
+              <a:gd name="connsiteY18" fmla="*/ 1285875 h 1328738"/>
+              <a:gd name="connsiteX19" fmla="*/ 885825 w 2571750"/>
+              <a:gd name="connsiteY19" fmla="*/ 1143000 h 1328738"/>
+              <a:gd name="connsiteX20" fmla="*/ 900113 w 2571750"/>
+              <a:gd name="connsiteY20" fmla="*/ 1085850 h 1328738"/>
+              <a:gd name="connsiteX21" fmla="*/ 928688 w 2571750"/>
+              <a:gd name="connsiteY21" fmla="*/ 785813 h 1328738"/>
+              <a:gd name="connsiteX22" fmla="*/ 957263 w 2571750"/>
+              <a:gd name="connsiteY22" fmla="*/ 542925 h 1328738"/>
+              <a:gd name="connsiteX23" fmla="*/ 971550 w 2571750"/>
+              <a:gd name="connsiteY23" fmla="*/ 500063 h 1328738"/>
+              <a:gd name="connsiteX24" fmla="*/ 1000125 w 2571750"/>
+              <a:gd name="connsiteY24" fmla="*/ 457200 h 1328738"/>
+              <a:gd name="connsiteX25" fmla="*/ 1071563 w 2571750"/>
+              <a:gd name="connsiteY25" fmla="*/ 342900 h 1328738"/>
+              <a:gd name="connsiteX26" fmla="*/ 1100138 w 2571750"/>
+              <a:gd name="connsiteY26" fmla="*/ 300038 h 1328738"/>
+              <a:gd name="connsiteX27" fmla="*/ 1114425 w 2571750"/>
+              <a:gd name="connsiteY27" fmla="*/ 257175 h 1328738"/>
+              <a:gd name="connsiteX28" fmla="*/ 1157288 w 2571750"/>
+              <a:gd name="connsiteY28" fmla="*/ 228600 h 1328738"/>
+              <a:gd name="connsiteX29" fmla="*/ 1243013 w 2571750"/>
+              <a:gd name="connsiteY29" fmla="*/ 157163 h 1328738"/>
+              <a:gd name="connsiteX30" fmla="*/ 1285875 w 2571750"/>
+              <a:gd name="connsiteY30" fmla="*/ 142875 h 1328738"/>
+              <a:gd name="connsiteX31" fmla="*/ 1328738 w 2571750"/>
+              <a:gd name="connsiteY31" fmla="*/ 114300 h 1328738"/>
+              <a:gd name="connsiteX32" fmla="*/ 1414463 w 2571750"/>
+              <a:gd name="connsiteY32" fmla="*/ 85725 h 1328738"/>
+              <a:gd name="connsiteX33" fmla="*/ 1457325 w 2571750"/>
+              <a:gd name="connsiteY33" fmla="*/ 57150 h 1328738"/>
+              <a:gd name="connsiteX34" fmla="*/ 1528763 w 2571750"/>
+              <a:gd name="connsiteY34" fmla="*/ 42863 h 1328738"/>
+              <a:gd name="connsiteX35" fmla="*/ 1785938 w 2571750"/>
+              <a:gd name="connsiteY35" fmla="*/ 0 h 1328738"/>
+              <a:gd name="connsiteX36" fmla="*/ 2571750 w 2571750"/>
+              <a:gd name="connsiteY36" fmla="*/ 14288 h 1328738"/>
+            </a:gdLst>
+            <a:ahLst/>
+            <a:cxnLst>
+              <a:cxn ang="0">
+                <a:pos x="connsiteX0" y="connsiteY0"/>
+              </a:cxn>
+              <a:cxn ang="0">
+                <a:pos x="connsiteX1" y="connsiteY1"/>
+              </a:cxn>
+              <a:cxn ang="0">
+                <a:pos x="connsiteX2" y="connsiteY2"/>
+              </a:cxn>
+              <a:cxn ang="0">
+                <a:pos x="connsiteX3" y="connsiteY3"/>
+              </a:cxn>
+              <a:cxn ang="0">
+                <a:pos x="connsiteX4" y="connsiteY4"/>
+              </a:cxn>
+              <a:cxn ang="0">
+                <a:pos x="connsiteX5" y="connsiteY5"/>
+              </a:cxn>
+              <a:cxn ang="0">
+                <a:pos x="connsiteX6" y="connsiteY6"/>
+              </a:cxn>
+              <a:cxn ang="0">
+                <a:pos x="connsiteX7" y="connsiteY7"/>
+              </a:cxn>
+              <a:cxn ang="0">
+                <a:pos x="connsiteX8" y="connsiteY8"/>
+              </a:cxn>
+              <a:cxn ang="0">
+                <a:pos x="connsiteX9" y="connsiteY9"/>
+              </a:cxn>
+              <a:cxn ang="0">
+                <a:pos x="connsiteX10" y="connsiteY10"/>
+              </a:cxn>
+              <a:cxn ang="0">
+                <a:pos x="connsiteX11" y="connsiteY11"/>
+              </a:cxn>
+              <a:cxn ang="0">
+                <a:pos x="connsiteX12" y="connsiteY12"/>
+              </a:cxn>
+              <a:cxn ang="0">
+                <a:pos x="connsiteX13" y="connsiteY13"/>
+              </a:cxn>
+              <a:cxn ang="0">
+                <a:pos x="connsiteX14" y="connsiteY14"/>
+              </a:cxn>
+              <a:cxn ang="0">
+                <a:pos x="connsiteX15" y="connsiteY15"/>
+              </a:cxn>
+              <a:cxn ang="0">
+                <a:pos x="connsiteX16" y="connsiteY16"/>
+              </a:cxn>
+              <a:cxn ang="0">
+                <a:pos x="connsiteX17" y="connsiteY17"/>
+              </a:cxn>
+              <a:cxn ang="0">
+                <a:pos x="connsiteX18" y="connsiteY18"/>
+              </a:cxn>
+              <a:cxn ang="0">
+                <a:pos x="connsiteX19" y="connsiteY19"/>
+              </a:cxn>
+              <a:cxn ang="0">
+                <a:pos x="connsiteX20" y="connsiteY20"/>
+              </a:cxn>
+              <a:cxn ang="0">
+                <a:pos x="connsiteX21" y="connsiteY21"/>
+              </a:cxn>
+              <a:cxn ang="0">
+                <a:pos x="connsiteX22" y="connsiteY22"/>
+              </a:cxn>
+              <a:cxn ang="0">
+                <a:pos x="connsiteX23" y="connsiteY23"/>
+              </a:cxn>
+              <a:cxn ang="0">
+                <a:pos x="connsiteX24" y="connsiteY24"/>
+              </a:cxn>
+              <a:cxn ang="0">
+                <a:pos x="connsiteX25" y="connsiteY25"/>
+              </a:cxn>
+              <a:cxn ang="0">
+                <a:pos x="connsiteX26" y="connsiteY26"/>
+              </a:cxn>
+              <a:cxn ang="0">
+                <a:pos x="connsiteX27" y="connsiteY27"/>
+              </a:cxn>
+              <a:cxn ang="0">
+                <a:pos x="connsiteX28" y="connsiteY28"/>
+              </a:cxn>
+              <a:cxn ang="0">
+                <a:pos x="connsiteX29" y="connsiteY29"/>
+              </a:cxn>
+              <a:cxn ang="0">
+                <a:pos x="connsiteX30" y="connsiteY30"/>
+              </a:cxn>
+              <a:cxn ang="0">
+                <a:pos x="connsiteX31" y="connsiteY31"/>
+              </a:cxn>
+              <a:cxn ang="0">
+                <a:pos x="connsiteX32" y="connsiteY32"/>
+              </a:cxn>
+              <a:cxn ang="0">
+                <a:pos x="connsiteX33" y="connsiteY33"/>
+              </a:cxn>
+              <a:cxn ang="0">
+                <a:pos x="connsiteX34" y="connsiteY34"/>
+              </a:cxn>
+              <a:cxn ang="0">
+                <a:pos x="connsiteX35" y="connsiteY35"/>
+              </a:cxn>
+              <a:cxn ang="0">
+                <a:pos x="connsiteX36" y="connsiteY36"/>
+              </a:cxn>
+            </a:cxnLst>
+            <a:rect l="l" t="t" r="r" b="b"/>
+            <a:pathLst>
+              <a:path w="2571750" h="1328738">
+                <a:moveTo>
+                  <a:pt x="0" y="314325"/>
+                </a:moveTo>
+                <a:cubicBezTo>
+                  <a:pt x="4763" y="333375"/>
+                  <a:pt x="8645" y="352667"/>
+                  <a:pt x="14288" y="371475"/>
+                </a:cubicBezTo>
+                <a:cubicBezTo>
+                  <a:pt x="22943" y="400325"/>
+                  <a:pt x="33338" y="428625"/>
+                  <a:pt x="42863" y="457200"/>
+                </a:cubicBezTo>
+                <a:lnTo>
+                  <a:pt x="57150" y="500063"/>
+                </a:lnTo>
+                <a:lnTo>
+                  <a:pt x="71438" y="542925"/>
+                </a:lnTo>
+                <a:lnTo>
+                  <a:pt x="85725" y="585788"/>
+                </a:lnTo>
+                <a:cubicBezTo>
+                  <a:pt x="90488" y="619125"/>
+                  <a:pt x="92441" y="652987"/>
+                  <a:pt x="100013" y="685800"/>
+                </a:cubicBezTo>
+                <a:cubicBezTo>
+                  <a:pt x="106786" y="715149"/>
+                  <a:pt x="121283" y="742304"/>
+                  <a:pt x="128588" y="771525"/>
+                </a:cubicBezTo>
+                <a:cubicBezTo>
+                  <a:pt x="133350" y="790575"/>
+                  <a:pt x="138615" y="809506"/>
+                  <a:pt x="142875" y="828675"/>
+                </a:cubicBezTo>
+                <a:cubicBezTo>
+                  <a:pt x="154525" y="881099"/>
+                  <a:pt x="156521" y="907498"/>
+                  <a:pt x="171450" y="957263"/>
+                </a:cubicBezTo>
+                <a:cubicBezTo>
+                  <a:pt x="171470" y="957330"/>
+                  <a:pt x="207158" y="1064386"/>
+                  <a:pt x="214313" y="1085850"/>
+                </a:cubicBezTo>
+                <a:cubicBezTo>
+                  <a:pt x="219076" y="1100138"/>
+                  <a:pt x="216069" y="1120359"/>
+                  <a:pt x="228600" y="1128713"/>
+                </a:cubicBezTo>
+                <a:cubicBezTo>
+                  <a:pt x="242888" y="1138238"/>
+                  <a:pt x="255771" y="1150314"/>
+                  <a:pt x="271463" y="1157288"/>
+                </a:cubicBezTo>
+                <a:cubicBezTo>
+                  <a:pt x="341412" y="1188376"/>
+                  <a:pt x="350395" y="1180967"/>
+                  <a:pt x="414338" y="1200150"/>
+                </a:cubicBezTo>
+                <a:cubicBezTo>
+                  <a:pt x="443188" y="1208805"/>
+                  <a:pt x="500063" y="1228725"/>
+                  <a:pt x="500063" y="1228725"/>
+                </a:cubicBezTo>
+                <a:cubicBezTo>
+                  <a:pt x="567987" y="1274008"/>
+                  <a:pt x="526634" y="1251869"/>
+                  <a:pt x="628650" y="1285875"/>
+                </a:cubicBezTo>
+                <a:lnTo>
+                  <a:pt x="714375" y="1314450"/>
+                </a:lnTo>
+                <a:lnTo>
+                  <a:pt x="842963" y="1328738"/>
+                </a:lnTo>
+                <a:cubicBezTo>
+                  <a:pt x="852488" y="1314450"/>
+                  <a:pt x="867677" y="1302607"/>
+                  <a:pt x="871538" y="1285875"/>
+                </a:cubicBezTo>
+                <a:cubicBezTo>
+                  <a:pt x="882300" y="1239238"/>
+                  <a:pt x="879056" y="1190381"/>
+                  <a:pt x="885825" y="1143000"/>
+                </a:cubicBezTo>
+                <a:cubicBezTo>
+                  <a:pt x="888602" y="1123561"/>
+                  <a:pt x="895350" y="1104900"/>
+                  <a:pt x="900113" y="1085850"/>
+                </a:cubicBezTo>
+                <a:cubicBezTo>
+                  <a:pt x="909638" y="985838"/>
+                  <a:pt x="920983" y="885982"/>
+                  <a:pt x="928688" y="785813"/>
+                </a:cubicBezTo>
+                <a:cubicBezTo>
+                  <a:pt x="939598" y="643981"/>
+                  <a:pt x="929458" y="640241"/>
+                  <a:pt x="957263" y="542925"/>
+                </a:cubicBezTo>
+                <a:cubicBezTo>
+                  <a:pt x="961400" y="528444"/>
+                  <a:pt x="964815" y="513533"/>
+                  <a:pt x="971550" y="500063"/>
+                </a:cubicBezTo>
+                <a:cubicBezTo>
+                  <a:pt x="979229" y="484704"/>
+                  <a:pt x="993151" y="472892"/>
+                  <a:pt x="1000125" y="457200"/>
+                </a:cubicBezTo>
+                <a:cubicBezTo>
+                  <a:pt x="1050237" y="344447"/>
+                  <a:pt x="994455" y="394305"/>
+                  <a:pt x="1071563" y="342900"/>
+                </a:cubicBezTo>
+                <a:cubicBezTo>
+                  <a:pt x="1081088" y="328613"/>
+                  <a:pt x="1092459" y="315397"/>
+                  <a:pt x="1100138" y="300038"/>
+                </a:cubicBezTo>
+                <a:cubicBezTo>
+                  <a:pt x="1106873" y="286567"/>
+                  <a:pt x="1105017" y="268935"/>
+                  <a:pt x="1114425" y="257175"/>
+                </a:cubicBezTo>
+                <a:cubicBezTo>
+                  <a:pt x="1125152" y="243766"/>
+                  <a:pt x="1144096" y="239593"/>
+                  <a:pt x="1157288" y="228600"/>
+                </a:cubicBezTo>
+                <a:cubicBezTo>
+                  <a:pt x="1204689" y="189100"/>
+                  <a:pt x="1189800" y="183770"/>
+                  <a:pt x="1243013" y="157163"/>
+                </a:cubicBezTo>
+                <a:cubicBezTo>
+                  <a:pt x="1256483" y="150428"/>
+                  <a:pt x="1272405" y="149610"/>
+                  <a:pt x="1285875" y="142875"/>
+                </a:cubicBezTo>
+                <a:cubicBezTo>
+                  <a:pt x="1301234" y="135196"/>
+                  <a:pt x="1313046" y="121274"/>
+                  <a:pt x="1328738" y="114300"/>
+                </a:cubicBezTo>
+                <a:cubicBezTo>
+                  <a:pt x="1356263" y="102067"/>
+                  <a:pt x="1389401" y="102433"/>
+                  <a:pt x="1414463" y="85725"/>
+                </a:cubicBezTo>
+                <a:cubicBezTo>
+                  <a:pt x="1428750" y="76200"/>
+                  <a:pt x="1441247" y="63179"/>
+                  <a:pt x="1457325" y="57150"/>
+                </a:cubicBezTo>
+                <a:cubicBezTo>
+                  <a:pt x="1480063" y="48623"/>
+                  <a:pt x="1505101" y="48323"/>
+                  <a:pt x="1528763" y="42863"/>
+                </a:cubicBezTo>
+                <a:cubicBezTo>
+                  <a:pt x="1713139" y="315"/>
+                  <a:pt x="1575171" y="21077"/>
+                  <a:pt x="1785938" y="0"/>
+                </a:cubicBezTo>
+                <a:cubicBezTo>
+                  <a:pt x="2390740" y="16801"/>
+                  <a:pt x="2128772" y="14288"/>
+                  <a:pt x="2571750" y="14288"/>
+                </a:cubicBezTo>
+              </a:path>
+            </a:pathLst>
+          </a:custGeom>
+          <a:ln/>
+        </p:spPr>
+        <p:style>
+          <a:lnRef idx="1">
+            <a:schemeClr val="dk1"/>
+          </a:lnRef>
+          <a:fillRef idx="0">
+            <a:schemeClr val="dk1"/>
+          </a:fillRef>
+          <a:effectRef idx="0">
+            <a:schemeClr val="dk1"/>
+          </a:effectRef>
+          <a:fontRef idx="minor">
+            <a:schemeClr val="tx1"/>
+          </a:fontRef>
+        </p:style>
+        <p:txBody>
+          <a:bodyPr rtlCol="0" anchor="ctr"/>
+          <a:lstStyle/>
+          <a:p>
+            <a:pPr algn="ctr"/>
+            <a:endParaRPr lang="en-US"/>
+          </a:p>
+        </p:txBody>
+      </p:sp>
+      <p:sp>
+        <p:nvSpPr>
+          <p:cNvPr id="22" name="TextBox 21">
+            <a:extLst>
+              <a:ext uri="{FF2B5EF4-FFF2-40B4-BE49-F238E27FC236}">
+                <a16:creationId xmlns:a16="http://schemas.microsoft.com/office/drawing/2014/main" id="{D6BD6963-8900-8848-BB63-B624C2422B48}"/>
+              </a:ext>
+            </a:extLst>
+          </p:cNvPr>
+          <p:cNvSpPr txBox="1"/>
+          <p:nvPr/>
+        </p:nvSpPr>
+        <p:spPr>
+          <a:xfrm>
+            <a:off x="1886537" y="125968"/>
+            <a:ext cx="2448299" cy="369332"/>
+          </a:xfrm>
+          <a:prstGeom prst="rect">
+            <a:avLst/>
+          </a:prstGeom>
+          <a:noFill/>
+        </p:spPr>
+        <p:txBody>
+          <a:bodyPr wrap="none" rtlCol="0">
+            <a:spAutoFit/>
+          </a:bodyPr>
+          <a:lstStyle/>
+          <a:p>
+            <a:r>
+              <a:rPr lang="en-US" dirty="0"/>
+              <a:t>Physiological hypothesis</a:t>
+            </a:r>
+          </a:p>
+        </p:txBody>
+      </p:sp>
+      <p:sp>
+        <p:nvSpPr>
+          <p:cNvPr id="23" name="TextBox 22">
+            <a:extLst>
+              <a:ext uri="{FF2B5EF4-FFF2-40B4-BE49-F238E27FC236}">
+                <a16:creationId xmlns:a16="http://schemas.microsoft.com/office/drawing/2014/main" id="{4433510A-661E-784A-9811-E61C2E22C6B2}"/>
+              </a:ext>
+            </a:extLst>
+          </p:cNvPr>
+          <p:cNvSpPr txBox="1"/>
+          <p:nvPr/>
+        </p:nvSpPr>
+        <p:spPr>
+          <a:xfrm>
+            <a:off x="2040544" y="3329822"/>
+            <a:ext cx="2289345" cy="369332"/>
+          </a:xfrm>
+          <a:prstGeom prst="rect">
+            <a:avLst/>
+          </a:prstGeom>
+          <a:noFill/>
+        </p:spPr>
+        <p:txBody>
+          <a:bodyPr wrap="none" rtlCol="0">
+            <a:spAutoFit/>
+          </a:bodyPr>
+          <a:lstStyle/>
+          <a:p>
+            <a:r>
+              <a:rPr lang="en-US" dirty="0"/>
+              <a:t>Behavioral hypothesis</a:t>
+            </a:r>
+          </a:p>
+        </p:txBody>
+      </p:sp>
+      <p:sp>
+        <p:nvSpPr>
+          <p:cNvPr id="24" name="TextBox 23">
+            <a:extLst>
+              <a:ext uri="{FF2B5EF4-FFF2-40B4-BE49-F238E27FC236}">
+                <a16:creationId xmlns:a16="http://schemas.microsoft.com/office/drawing/2014/main" id="{8BF02C80-E9EC-5348-8396-E09F0E1C512A}"/>
+              </a:ext>
+            </a:extLst>
+          </p:cNvPr>
+          <p:cNvSpPr txBox="1"/>
+          <p:nvPr/>
+        </p:nvSpPr>
+        <p:spPr>
+          <a:xfrm>
+            <a:off x="1828800" y="1125259"/>
+            <a:ext cx="1598515" cy="369332"/>
+          </a:xfrm>
+          <a:prstGeom prst="rect">
+            <a:avLst/>
+          </a:prstGeom>
+          <a:noFill/>
+        </p:spPr>
+        <p:txBody>
+          <a:bodyPr wrap="none" rtlCol="0">
+            <a:spAutoFit/>
+          </a:bodyPr>
+          <a:lstStyle/>
+          <a:p>
+            <a:r>
+              <a:rPr lang="en-US" dirty="0"/>
+              <a:t>“mini-puberty”</a:t>
+            </a:r>
+          </a:p>
+        </p:txBody>
+      </p:sp>
+      <p:sp>
+        <p:nvSpPr>
+          <p:cNvPr id="25" name="Freeform 24">
+            <a:extLst>
+              <a:ext uri="{FF2B5EF4-FFF2-40B4-BE49-F238E27FC236}">
+                <a16:creationId xmlns:a16="http://schemas.microsoft.com/office/drawing/2014/main" id="{67022016-D8F2-5440-B0E7-714720A94477}"/>
+              </a:ext>
+            </a:extLst>
+          </p:cNvPr>
+          <p:cNvSpPr/>
+          <p:nvPr/>
+        </p:nvSpPr>
+        <p:spPr>
+          <a:xfrm>
+            <a:off x="2000250" y="1571625"/>
+            <a:ext cx="600075" cy="754850"/>
+          </a:xfrm>
+          <a:custGeom>
+            <a:avLst/>
+            <a:gdLst>
+              <a:gd name="connsiteX0" fmla="*/ 600075 w 600075"/>
+              <a:gd name="connsiteY0" fmla="*/ 0 h 754850"/>
+              <a:gd name="connsiteX1" fmla="*/ 585788 w 600075"/>
+              <a:gd name="connsiteY1" fmla="*/ 128588 h 754850"/>
+              <a:gd name="connsiteX2" fmla="*/ 571500 w 600075"/>
+              <a:gd name="connsiteY2" fmla="*/ 328613 h 754850"/>
+              <a:gd name="connsiteX3" fmla="*/ 557213 w 600075"/>
+              <a:gd name="connsiteY3" fmla="*/ 371475 h 754850"/>
+              <a:gd name="connsiteX4" fmla="*/ 428625 w 600075"/>
+              <a:gd name="connsiteY4" fmla="*/ 442913 h 754850"/>
+              <a:gd name="connsiteX5" fmla="*/ 385763 w 600075"/>
+              <a:gd name="connsiteY5" fmla="*/ 471488 h 754850"/>
+              <a:gd name="connsiteX6" fmla="*/ 300038 w 600075"/>
+              <a:gd name="connsiteY6" fmla="*/ 500063 h 754850"/>
+              <a:gd name="connsiteX7" fmla="*/ 257175 w 600075"/>
+              <a:gd name="connsiteY7" fmla="*/ 514350 h 754850"/>
+              <a:gd name="connsiteX8" fmla="*/ 171450 w 600075"/>
+              <a:gd name="connsiteY8" fmla="*/ 571500 h 754850"/>
+              <a:gd name="connsiteX9" fmla="*/ 142875 w 600075"/>
+              <a:gd name="connsiteY9" fmla="*/ 614363 h 754850"/>
+              <a:gd name="connsiteX10" fmla="*/ 57150 w 600075"/>
+              <a:gd name="connsiteY10" fmla="*/ 671513 h 754850"/>
+              <a:gd name="connsiteX11" fmla="*/ 14288 w 600075"/>
+              <a:gd name="connsiteY11" fmla="*/ 714375 h 754850"/>
+              <a:gd name="connsiteX12" fmla="*/ 0 w 600075"/>
+              <a:gd name="connsiteY12" fmla="*/ 671513 h 754850"/>
+              <a:gd name="connsiteX13" fmla="*/ 14288 w 600075"/>
+              <a:gd name="connsiteY13" fmla="*/ 628650 h 754850"/>
+              <a:gd name="connsiteX14" fmla="*/ 28575 w 600075"/>
+              <a:gd name="connsiteY14" fmla="*/ 742950 h 754850"/>
+              <a:gd name="connsiteX15" fmla="*/ 157163 w 600075"/>
+              <a:gd name="connsiteY15" fmla="*/ 742950 h 754850"/>
+            </a:gdLst>
+            <a:ahLst/>
+            <a:cxnLst>
+              <a:cxn ang="0">
+                <a:pos x="connsiteX0" y="connsiteY0"/>
+              </a:cxn>
+              <a:cxn ang="0">
+                <a:pos x="connsiteX1" y="connsiteY1"/>
+              </a:cxn>
+              <a:cxn ang="0">
+                <a:pos x="connsiteX2" y="connsiteY2"/>
+              </a:cxn>
+              <a:cxn ang="0">
+                <a:pos x="connsiteX3" y="connsiteY3"/>
+              </a:cxn>
+              <a:cxn ang="0">
+                <a:pos x="connsiteX4" y="connsiteY4"/>
+              </a:cxn>
+              <a:cxn ang="0">
+                <a:pos x="connsiteX5" y="connsiteY5"/>
+              </a:cxn>
+              <a:cxn ang="0">
+                <a:pos x="connsiteX6" y="connsiteY6"/>
+              </a:cxn>
+              <a:cxn ang="0">
+                <a:pos x="connsiteX7" y="connsiteY7"/>
+              </a:cxn>
+              <a:cxn ang="0">
+                <a:pos x="connsiteX8" y="connsiteY8"/>
+              </a:cxn>
+              <a:cxn ang="0">
+                <a:pos x="connsiteX9" y="connsiteY9"/>
+              </a:cxn>
+              <a:cxn ang="0">
+                <a:pos x="connsiteX10" y="connsiteY10"/>
+              </a:cxn>
+              <a:cxn ang="0">
+                <a:pos x="connsiteX11" y="connsiteY11"/>
+              </a:cxn>
+              <a:cxn ang="0">
+                <a:pos x="connsiteX12" y="connsiteY12"/>
+              </a:cxn>
+              <a:cxn ang="0">
+                <a:pos x="connsiteX13" y="connsiteY13"/>
+              </a:cxn>
+              <a:cxn ang="0">
+                <a:pos x="connsiteX14" y="connsiteY14"/>
+              </a:cxn>
+              <a:cxn ang="0">
+                <a:pos x="connsiteX15" y="connsiteY15"/>
+              </a:cxn>
+            </a:cxnLst>
+            <a:rect l="l" t="t" r="r" b="b"/>
+            <a:pathLst>
+              <a:path w="600075" h="754850">
+                <a:moveTo>
+                  <a:pt x="600075" y="0"/>
+                </a:moveTo>
+                <a:cubicBezTo>
+                  <a:pt x="595313" y="42863"/>
+                  <a:pt x="589524" y="85624"/>
+                  <a:pt x="585788" y="128588"/>
+                </a:cubicBezTo>
+                <a:cubicBezTo>
+                  <a:pt x="579997" y="195182"/>
+                  <a:pt x="579310" y="262226"/>
+                  <a:pt x="571500" y="328613"/>
+                </a:cubicBezTo>
+                <a:cubicBezTo>
+                  <a:pt x="569740" y="343570"/>
+                  <a:pt x="565567" y="358944"/>
+                  <a:pt x="557213" y="371475"/>
+                </a:cubicBezTo>
+                <a:cubicBezTo>
+                  <a:pt x="503402" y="452192"/>
+                  <a:pt x="518090" y="383269"/>
+                  <a:pt x="428625" y="442913"/>
+                </a:cubicBezTo>
+                <a:cubicBezTo>
+                  <a:pt x="414338" y="452438"/>
+                  <a:pt x="401454" y="464514"/>
+                  <a:pt x="385763" y="471488"/>
+                </a:cubicBezTo>
+                <a:cubicBezTo>
+                  <a:pt x="358238" y="483721"/>
+                  <a:pt x="328613" y="490538"/>
+                  <a:pt x="300038" y="500063"/>
+                </a:cubicBezTo>
+                <a:lnTo>
+                  <a:pt x="257175" y="514350"/>
+                </a:lnTo>
+                <a:cubicBezTo>
+                  <a:pt x="228600" y="533400"/>
+                  <a:pt x="190500" y="542925"/>
+                  <a:pt x="171450" y="571500"/>
+                </a:cubicBezTo>
+                <a:cubicBezTo>
+                  <a:pt x="161925" y="585788"/>
+                  <a:pt x="155798" y="603055"/>
+                  <a:pt x="142875" y="614363"/>
+                </a:cubicBezTo>
+                <a:cubicBezTo>
+                  <a:pt x="117029" y="636978"/>
+                  <a:pt x="81434" y="647229"/>
+                  <a:pt x="57150" y="671513"/>
+                </a:cubicBezTo>
+                <a:lnTo>
+                  <a:pt x="14288" y="714375"/>
+                </a:lnTo>
+                <a:cubicBezTo>
+                  <a:pt x="9525" y="700088"/>
+                  <a:pt x="0" y="686573"/>
+                  <a:pt x="0" y="671513"/>
+                </a:cubicBezTo>
+                <a:cubicBezTo>
+                  <a:pt x="0" y="656452"/>
+                  <a:pt x="8695" y="614667"/>
+                  <a:pt x="14288" y="628650"/>
+                </a:cubicBezTo>
+                <a:cubicBezTo>
+                  <a:pt x="28548" y="664300"/>
+                  <a:pt x="-1408" y="718964"/>
+                  <a:pt x="28575" y="742950"/>
+                </a:cubicBezTo>
+                <a:cubicBezTo>
+                  <a:pt x="62045" y="769726"/>
+                  <a:pt x="114300" y="742950"/>
+                  <a:pt x="157163" y="742950"/>
+                </a:cubicBezTo>
+              </a:path>
+            </a:pathLst>
+          </a:custGeom>
+        </p:spPr>
+        <p:style>
+          <a:lnRef idx="1">
+            <a:schemeClr val="dk1"/>
+          </a:lnRef>
+          <a:fillRef idx="0">
+            <a:schemeClr val="dk1"/>
+          </a:fillRef>
+          <a:effectRef idx="0">
+            <a:schemeClr val="dk1"/>
+          </a:effectRef>
+          <a:fontRef idx="minor">
+            <a:schemeClr val="tx1"/>
+          </a:fontRef>
+        </p:style>
+        <p:txBody>
+          <a:bodyPr rtlCol="0" anchor="ctr"/>
+          <a:lstStyle/>
+          <a:p>
+            <a:pPr algn="ctr"/>
+            <a:endParaRPr lang="en-US"/>
+          </a:p>
+        </p:txBody>
+      </p:sp>
+      <p:sp>
+        <p:nvSpPr>
+          <p:cNvPr id="26" name="TextBox 25">
+            <a:extLst>
+              <a:ext uri="{FF2B5EF4-FFF2-40B4-BE49-F238E27FC236}">
+                <a16:creationId xmlns:a16="http://schemas.microsoft.com/office/drawing/2014/main" id="{DF9DA8B8-99C8-AB42-AA84-495DDD16EAC0}"/>
+              </a:ext>
+            </a:extLst>
+          </p:cNvPr>
+          <p:cNvSpPr txBox="1"/>
+          <p:nvPr/>
+        </p:nvSpPr>
+        <p:spPr>
+          <a:xfrm rot="16200000">
+            <a:off x="1749799" y="5957651"/>
+            <a:ext cx="489236" cy="369332"/>
+          </a:xfrm>
+          <a:prstGeom prst="rect">
+            <a:avLst/>
+          </a:prstGeom>
+          <a:noFill/>
+        </p:spPr>
+        <p:txBody>
+          <a:bodyPr wrap="none" rtlCol="0">
+            <a:spAutoFit/>
+          </a:bodyPr>
+          <a:lstStyle/>
+          <a:p>
+            <a:r>
+              <a:rPr lang="en-US" dirty="0"/>
+              <a:t>0-1</a:t>
+            </a:r>
+          </a:p>
+        </p:txBody>
+      </p:sp>
+      <p:sp>
+        <p:nvSpPr>
+          <p:cNvPr id="27" name="TextBox 26">
+            <a:extLst>
+              <a:ext uri="{FF2B5EF4-FFF2-40B4-BE49-F238E27FC236}">
+                <a16:creationId xmlns:a16="http://schemas.microsoft.com/office/drawing/2014/main" id="{05CD5C45-51EF-834B-8656-3423B6032691}"/>
+              </a:ext>
+            </a:extLst>
+          </p:cNvPr>
+          <p:cNvSpPr txBox="1"/>
+          <p:nvPr/>
+        </p:nvSpPr>
+        <p:spPr>
+          <a:xfrm rot="16200000">
+            <a:off x="2376623" y="5985753"/>
+            <a:ext cx="606256" cy="369332"/>
+          </a:xfrm>
+          <a:prstGeom prst="rect">
+            <a:avLst/>
+          </a:prstGeom>
+          <a:noFill/>
+        </p:spPr>
+        <p:txBody>
+          <a:bodyPr wrap="none" rtlCol="0">
+            <a:spAutoFit/>
+          </a:bodyPr>
+          <a:lstStyle/>
+          <a:p>
+            <a:r>
+              <a:rPr lang="en-US" dirty="0"/>
+              <a:t>5-15</a:t>
+            </a:r>
+          </a:p>
+        </p:txBody>
+      </p:sp>
+      <p:sp>
+        <p:nvSpPr>
+          <p:cNvPr id="28" name="TextBox 27">
+            <a:extLst>
+              <a:ext uri="{FF2B5EF4-FFF2-40B4-BE49-F238E27FC236}">
+                <a16:creationId xmlns:a16="http://schemas.microsoft.com/office/drawing/2014/main" id="{46AF2BFF-438D-8B43-B163-C204935BF286}"/>
+              </a:ext>
+            </a:extLst>
+          </p:cNvPr>
+          <p:cNvSpPr txBox="1"/>
+          <p:nvPr/>
+        </p:nvSpPr>
+        <p:spPr>
+          <a:xfrm rot="16200000">
+            <a:off x="2950752" y="5983970"/>
+            <a:ext cx="534121" cy="369332"/>
+          </a:xfrm>
+          <a:prstGeom prst="rect">
+            <a:avLst/>
+          </a:prstGeom>
+          <a:noFill/>
+        </p:spPr>
+        <p:txBody>
+          <a:bodyPr wrap="none" rtlCol="0">
+            <a:spAutoFit/>
+          </a:bodyPr>
+          <a:lstStyle/>
+          <a:p>
+            <a:r>
+              <a:rPr lang="en-US" dirty="0"/>
+              <a:t>15+</a:t>
+            </a:r>
+          </a:p>
+        </p:txBody>
+      </p:sp>
+      <p:graphicFrame>
+        <p:nvGraphicFramePr>
+          <p:cNvPr id="30" name="Table 29">
+            <a:extLst>
+              <a:ext uri="{FF2B5EF4-FFF2-40B4-BE49-F238E27FC236}">
+                <a16:creationId xmlns:a16="http://schemas.microsoft.com/office/drawing/2014/main" id="{72FA2257-46DB-DF4E-AD32-D5A3F401F2F4}"/>
+              </a:ext>
+            </a:extLst>
+          </p:cNvPr>
+          <p:cNvGraphicFramePr>
+            <a:graphicFrameLocks noGrp="1"/>
+          </p:cNvGraphicFramePr>
+          <p:nvPr>
+            <p:extLst>
+              <p:ext uri="{D42A27DB-BD31-4B8C-83A1-F6EECF244321}">
+                <p14:modId xmlns:p14="http://schemas.microsoft.com/office/powerpoint/2010/main" val="2145061277"/>
+              </p:ext>
+            </p:extLst>
+          </p:nvPr>
+        </p:nvGraphicFramePr>
+        <p:xfrm>
+          <a:off x="5413166" y="495300"/>
+          <a:ext cx="5815012" cy="5093147"/>
+        </p:xfrm>
+        <a:graphic>
+          <a:graphicData uri="http://schemas.openxmlformats.org/drawingml/2006/table">
+            <a:tbl>
+              <a:tblPr firstRow="1" bandRow="1">
+                <a:tableStyleId>{5C22544A-7EE6-4342-B048-85BDC9FD1C3A}</a:tableStyleId>
+              </a:tblPr>
+              <a:tblGrid>
+                <a:gridCol w="587892">
+                  <a:extLst>
+                    <a:ext uri="{9D8B030D-6E8A-4147-A177-3AD203B41FA5}">
+                      <a16:colId xmlns:a16="http://schemas.microsoft.com/office/drawing/2014/main" val="1951193675"/>
+                    </a:ext>
+                  </a:extLst>
+                </a:gridCol>
+                <a:gridCol w="1393046">
+                  <a:extLst>
+                    <a:ext uri="{9D8B030D-6E8A-4147-A177-3AD203B41FA5}">
+                      <a16:colId xmlns:a16="http://schemas.microsoft.com/office/drawing/2014/main" val="1922164336"/>
+                    </a:ext>
+                  </a:extLst>
+                </a:gridCol>
+                <a:gridCol w="1917037">
+                  <a:extLst>
+                    <a:ext uri="{9D8B030D-6E8A-4147-A177-3AD203B41FA5}">
+                      <a16:colId xmlns:a16="http://schemas.microsoft.com/office/drawing/2014/main" val="3404533028"/>
+                    </a:ext>
+                  </a:extLst>
+                </a:gridCol>
+                <a:gridCol w="1917037">
+                  <a:extLst>
+                    <a:ext uri="{9D8B030D-6E8A-4147-A177-3AD203B41FA5}">
+                      <a16:colId xmlns:a16="http://schemas.microsoft.com/office/drawing/2014/main" val="1039345674"/>
+                    </a:ext>
+                  </a:extLst>
+                </a:gridCol>
+              </a:tblGrid>
+              <a:tr h="795467">
+                <a:tc>
+                  <a:txBody>
+                    <a:bodyPr/>
+                    <a:lstStyle/>
+                    <a:p>
+                      <a:endParaRPr lang="en-US" dirty="0"/>
+                    </a:p>
+                  </a:txBody>
+                  <a:tcPr/>
+                </a:tc>
+                <a:tc>
+                  <a:txBody>
+                    <a:bodyPr/>
+                    <a:lstStyle/>
+                    <a:p>
+                      <a:r>
+                        <a:rPr lang="en-US" dirty="0"/>
+                        <a:t>Male-bias</a:t>
+                      </a:r>
+                    </a:p>
+                  </a:txBody>
+                  <a:tcPr/>
+                </a:tc>
+                <a:tc>
+                  <a:txBody>
+                    <a:bodyPr/>
+                    <a:lstStyle/>
+                    <a:p>
+                      <a:r>
+                        <a:rPr lang="en-US" dirty="0"/>
+                        <a:t>Female-bias</a:t>
+                      </a:r>
+                    </a:p>
+                  </a:txBody>
+                  <a:tcPr/>
+                </a:tc>
+                <a:tc>
+                  <a:txBody>
+                    <a:bodyPr/>
+                    <a:lstStyle/>
+                    <a:p>
+                      <a:endParaRPr lang="en-US" dirty="0"/>
+                    </a:p>
+                  </a:txBody>
+                  <a:tcPr/>
+                </a:tc>
+                <a:extLst>
+                  <a:ext uri="{0D108BD9-81ED-4DB2-BD59-A6C34878D82A}">
+                    <a16:rowId xmlns:a16="http://schemas.microsoft.com/office/drawing/2014/main" val="2866036138"/>
+                  </a:ext>
+                </a:extLst>
+              </a:tr>
+              <a:tr h="1437455">
+                <a:tc>
+                  <a:txBody>
+                    <a:bodyPr/>
+                    <a:lstStyle/>
+                    <a:p>
+                      <a:r>
+                        <a:rPr lang="en-US" dirty="0"/>
+                        <a:t>PH</a:t>
+                      </a:r>
+                    </a:p>
+                  </a:txBody>
+                  <a:tcPr/>
+                </a:tc>
+                <a:tc>
+                  <a:txBody>
+                    <a:bodyPr/>
+                    <a:lstStyle/>
+                    <a:p>
+                      <a:r>
+                        <a:rPr lang="en-US" dirty="0"/>
+                        <a:t>In ages when sex-hormones are physiologically  active</a:t>
+                      </a:r>
+                    </a:p>
+                  </a:txBody>
+                  <a:tcPr/>
+                </a:tc>
+                <a:tc>
+                  <a:txBody>
+                    <a:bodyPr/>
+                    <a:lstStyle/>
+                    <a:p>
+                      <a:r>
+                        <a:rPr lang="en-US" dirty="0"/>
+                        <a:t>When strong immune responses enhance disease or favor milder disease </a:t>
+                      </a:r>
+                    </a:p>
+                  </a:txBody>
+                  <a:tcPr/>
+                </a:tc>
+                <a:tc>
+                  <a:txBody>
+                    <a:bodyPr/>
+                    <a:lstStyle/>
+                    <a:p>
+                      <a:pPr marL="0" marR="0" lvl="0" indent="0" algn="l" defTabSz="914400" rtl="0" eaLnBrk="1" fontAlgn="auto" latinLnBrk="0" hangingPunct="1">
+                        <a:lnSpc>
+                          <a:spcPct val="100000"/>
+                        </a:lnSpc>
+                        <a:spcBef>
+                          <a:spcPts val="0"/>
+                        </a:spcBef>
+                        <a:spcAft>
+                          <a:spcPts val="0"/>
+                        </a:spcAft>
+                        <a:buClrTx/>
+                        <a:buSzTx/>
+                        <a:buFontTx/>
+                        <a:buNone/>
+                        <a:tabLst/>
+                        <a:defRPr/>
+                      </a:pPr>
+                      <a:r>
+                        <a:rPr lang="en-US" dirty="0"/>
+                        <a:t>In elderly, PH predicts sex bias should disappear or decrease </a:t>
+                      </a:r>
+                    </a:p>
+                    <a:p>
+                      <a:endParaRPr lang="en-US" dirty="0"/>
+                    </a:p>
+                  </a:txBody>
+                  <a:tcPr/>
+                </a:tc>
+                <a:extLst>
+                  <a:ext uri="{0D108BD9-81ED-4DB2-BD59-A6C34878D82A}">
+                    <a16:rowId xmlns:a16="http://schemas.microsoft.com/office/drawing/2014/main" val="2257723493"/>
+                  </a:ext>
+                </a:extLst>
+              </a:tr>
+              <a:tr h="795467">
+                <a:tc>
+                  <a:txBody>
+                    <a:bodyPr/>
+                    <a:lstStyle/>
+                    <a:p>
+                      <a:r>
+                        <a:rPr lang="en-US" dirty="0"/>
+                        <a:t>BH</a:t>
+                      </a:r>
+                    </a:p>
+                  </a:txBody>
+                  <a:tcPr/>
+                </a:tc>
+                <a:tc>
+                  <a:txBody>
+                    <a:bodyPr/>
+                    <a:lstStyle/>
+                    <a:p>
+                      <a:r>
+                        <a:rPr lang="en-US" dirty="0"/>
+                        <a:t>After puberty, when gender roles lead to more exposure among men</a:t>
+                      </a:r>
+                    </a:p>
+                  </a:txBody>
+                  <a:tcPr/>
+                </a:tc>
+                <a:tc>
+                  <a:txBody>
+                    <a:bodyPr/>
+                    <a:lstStyle/>
+                    <a:p>
+                      <a:endParaRPr lang="en-US" dirty="0"/>
+                    </a:p>
+                  </a:txBody>
+                  <a:tcPr/>
+                </a:tc>
+                <a:tc>
+                  <a:txBody>
+                    <a:bodyPr/>
+                    <a:lstStyle/>
+                    <a:p>
+                      <a:r>
+                        <a:rPr lang="en-US" dirty="0"/>
+                        <a:t>Bias patterns are predicted to differ in populations with contrasting social/behavior profiles; any difference in exposure likely due to BH</a:t>
+                      </a:r>
+                    </a:p>
+                  </a:txBody>
+                  <a:tcPr/>
+                </a:tc>
+                <a:extLst>
+                  <a:ext uri="{0D108BD9-81ED-4DB2-BD59-A6C34878D82A}">
+                    <a16:rowId xmlns:a16="http://schemas.microsoft.com/office/drawing/2014/main" val="718923052"/>
+                  </a:ext>
+                </a:extLst>
+              </a:tr>
+            </a:tbl>
+          </a:graphicData>
+        </a:graphic>
+      </p:graphicFrame>
+      <p:sp>
+        <p:nvSpPr>
+          <p:cNvPr id="34" name="Freeform 33">
+            <a:extLst>
+              <a:ext uri="{FF2B5EF4-FFF2-40B4-BE49-F238E27FC236}">
+                <a16:creationId xmlns:a16="http://schemas.microsoft.com/office/drawing/2014/main" id="{80C3E5F5-D398-DB4C-B794-2F7652249B86}"/>
+              </a:ext>
+            </a:extLst>
+          </p:cNvPr>
+          <p:cNvSpPr/>
+          <p:nvPr/>
+        </p:nvSpPr>
+        <p:spPr>
+          <a:xfrm>
+            <a:off x="1871663" y="4686178"/>
+            <a:ext cx="2771775" cy="1143121"/>
+          </a:xfrm>
+          <a:custGeom>
+            <a:avLst/>
+            <a:gdLst>
+              <a:gd name="connsiteX0" fmla="*/ 0 w 2771775"/>
+              <a:gd name="connsiteY0" fmla="*/ 1128833 h 1143121"/>
+              <a:gd name="connsiteX1" fmla="*/ 100012 w 2771775"/>
+              <a:gd name="connsiteY1" fmla="*/ 1143121 h 1143121"/>
+              <a:gd name="connsiteX2" fmla="*/ 385762 w 2771775"/>
+              <a:gd name="connsiteY2" fmla="*/ 1114546 h 1143121"/>
+              <a:gd name="connsiteX3" fmla="*/ 514350 w 2771775"/>
+              <a:gd name="connsiteY3" fmla="*/ 1085971 h 1143121"/>
+              <a:gd name="connsiteX4" fmla="*/ 957262 w 2771775"/>
+              <a:gd name="connsiteY4" fmla="*/ 1057396 h 1143121"/>
+              <a:gd name="connsiteX5" fmla="*/ 1028700 w 2771775"/>
+              <a:gd name="connsiteY5" fmla="*/ 1043108 h 1143121"/>
+              <a:gd name="connsiteX6" fmla="*/ 1128712 w 2771775"/>
+              <a:gd name="connsiteY6" fmla="*/ 928808 h 1143121"/>
+              <a:gd name="connsiteX7" fmla="*/ 1157287 w 2771775"/>
+              <a:gd name="connsiteY7" fmla="*/ 843083 h 1143121"/>
+              <a:gd name="connsiteX8" fmla="*/ 1185862 w 2771775"/>
+              <a:gd name="connsiteY8" fmla="*/ 785933 h 1143121"/>
+              <a:gd name="connsiteX9" fmla="*/ 1200150 w 2771775"/>
+              <a:gd name="connsiteY9" fmla="*/ 714496 h 1143121"/>
+              <a:gd name="connsiteX10" fmla="*/ 1214437 w 2771775"/>
+              <a:gd name="connsiteY10" fmla="*/ 657346 h 1143121"/>
+              <a:gd name="connsiteX11" fmla="*/ 1228725 w 2771775"/>
+              <a:gd name="connsiteY11" fmla="*/ 500183 h 1143121"/>
+              <a:gd name="connsiteX12" fmla="*/ 1257300 w 2771775"/>
+              <a:gd name="connsiteY12" fmla="*/ 371596 h 1143121"/>
+              <a:gd name="connsiteX13" fmla="*/ 1271587 w 2771775"/>
+              <a:gd name="connsiteY13" fmla="*/ 328733 h 1143121"/>
+              <a:gd name="connsiteX14" fmla="*/ 1300162 w 2771775"/>
+              <a:gd name="connsiteY14" fmla="*/ 214433 h 1143121"/>
+              <a:gd name="connsiteX15" fmla="*/ 1343025 w 2771775"/>
+              <a:gd name="connsiteY15" fmla="*/ 85846 h 1143121"/>
+              <a:gd name="connsiteX16" fmla="*/ 1357312 w 2771775"/>
+              <a:gd name="connsiteY16" fmla="*/ 42983 h 1143121"/>
+              <a:gd name="connsiteX17" fmla="*/ 1400175 w 2771775"/>
+              <a:gd name="connsiteY17" fmla="*/ 28696 h 1143121"/>
+              <a:gd name="connsiteX18" fmla="*/ 1443037 w 2771775"/>
+              <a:gd name="connsiteY18" fmla="*/ 121 h 1143121"/>
+              <a:gd name="connsiteX19" fmla="*/ 1728787 w 2771775"/>
+              <a:gd name="connsiteY19" fmla="*/ 28696 h 1143121"/>
+              <a:gd name="connsiteX20" fmla="*/ 1785937 w 2771775"/>
+              <a:gd name="connsiteY20" fmla="*/ 42983 h 1143121"/>
+              <a:gd name="connsiteX21" fmla="*/ 1871662 w 2771775"/>
+              <a:gd name="connsiteY21" fmla="*/ 71558 h 1143121"/>
+              <a:gd name="connsiteX22" fmla="*/ 2000250 w 2771775"/>
+              <a:gd name="connsiteY22" fmla="*/ 128708 h 1143121"/>
+              <a:gd name="connsiteX23" fmla="*/ 2043112 w 2771775"/>
+              <a:gd name="connsiteY23" fmla="*/ 142996 h 1143121"/>
+              <a:gd name="connsiteX24" fmla="*/ 2171700 w 2771775"/>
+              <a:gd name="connsiteY24" fmla="*/ 214433 h 1143121"/>
+              <a:gd name="connsiteX25" fmla="*/ 2257425 w 2771775"/>
+              <a:gd name="connsiteY25" fmla="*/ 257296 h 1143121"/>
+              <a:gd name="connsiteX26" fmla="*/ 2343150 w 2771775"/>
+              <a:gd name="connsiteY26" fmla="*/ 300158 h 1143121"/>
+              <a:gd name="connsiteX27" fmla="*/ 2428875 w 2771775"/>
+              <a:gd name="connsiteY27" fmla="*/ 357308 h 1143121"/>
+              <a:gd name="connsiteX28" fmla="*/ 2514600 w 2771775"/>
+              <a:gd name="connsiteY28" fmla="*/ 385883 h 1143121"/>
+              <a:gd name="connsiteX29" fmla="*/ 2600325 w 2771775"/>
+              <a:gd name="connsiteY29" fmla="*/ 443033 h 1143121"/>
+              <a:gd name="connsiteX30" fmla="*/ 2643187 w 2771775"/>
+              <a:gd name="connsiteY30" fmla="*/ 457321 h 1143121"/>
+              <a:gd name="connsiteX31" fmla="*/ 2771775 w 2771775"/>
+              <a:gd name="connsiteY31" fmla="*/ 514471 h 1143121"/>
+            </a:gdLst>
+            <a:ahLst/>
+            <a:cxnLst>
+              <a:cxn ang="0">
+                <a:pos x="connsiteX0" y="connsiteY0"/>
+              </a:cxn>
+              <a:cxn ang="0">
+                <a:pos x="connsiteX1" y="connsiteY1"/>
+              </a:cxn>
+              <a:cxn ang="0">
+                <a:pos x="connsiteX2" y="connsiteY2"/>
+              </a:cxn>
+              <a:cxn ang="0">
+                <a:pos x="connsiteX3" y="connsiteY3"/>
+              </a:cxn>
+              <a:cxn ang="0">
+                <a:pos x="connsiteX4" y="connsiteY4"/>
+              </a:cxn>
+              <a:cxn ang="0">
+                <a:pos x="connsiteX5" y="connsiteY5"/>
+              </a:cxn>
+              <a:cxn ang="0">
+                <a:pos x="connsiteX6" y="connsiteY6"/>
+              </a:cxn>
+              <a:cxn ang="0">
+                <a:pos x="connsiteX7" y="connsiteY7"/>
+              </a:cxn>
+              <a:cxn ang="0">
+                <a:pos x="connsiteX8" y="connsiteY8"/>
+              </a:cxn>
+              <a:cxn ang="0">
+                <a:pos x="connsiteX9" y="connsiteY9"/>
+              </a:cxn>
+              <a:cxn ang="0">
+                <a:pos x="connsiteX10" y="connsiteY10"/>
+              </a:cxn>
+              <a:cxn ang="0">
+                <a:pos x="connsiteX11" y="connsiteY11"/>
+              </a:cxn>
+              <a:cxn ang="0">
+                <a:pos x="connsiteX12" y="connsiteY12"/>
+              </a:cxn>
+              <a:cxn ang="0">
+                <a:pos x="connsiteX13" y="connsiteY13"/>
+              </a:cxn>
+              <a:cxn ang="0">
+                <a:pos x="connsiteX14" y="connsiteY14"/>
+              </a:cxn>
+              <a:cxn ang="0">
+                <a:pos x="connsiteX15" y="connsiteY15"/>
+              </a:cxn>
+              <a:cxn ang="0">
+                <a:pos x="connsiteX16" y="connsiteY16"/>
+              </a:cxn>
+              <a:cxn ang="0">
+                <a:pos x="connsiteX17" y="connsiteY17"/>
+              </a:cxn>
+              <a:cxn ang="0">
+                <a:pos x="connsiteX18" y="connsiteY18"/>
+              </a:cxn>
+              <a:cxn ang="0">
+                <a:pos x="connsiteX19" y="connsiteY19"/>
+              </a:cxn>
+              <a:cxn ang="0">
+                <a:pos x="connsiteX20" y="connsiteY20"/>
+              </a:cxn>
+              <a:cxn ang="0">
+                <a:pos x="connsiteX21" y="connsiteY21"/>
+              </a:cxn>
+              <a:cxn ang="0">
+                <a:pos x="connsiteX22" y="connsiteY22"/>
+              </a:cxn>
+              <a:cxn ang="0">
+                <a:pos x="connsiteX23" y="connsiteY23"/>
+              </a:cxn>
+              <a:cxn ang="0">
+                <a:pos x="connsiteX24" y="connsiteY24"/>
+              </a:cxn>
+              <a:cxn ang="0">
+                <a:pos x="connsiteX25" y="connsiteY25"/>
+              </a:cxn>
+              <a:cxn ang="0">
+                <a:pos x="connsiteX26" y="connsiteY26"/>
+              </a:cxn>
+              <a:cxn ang="0">
+                <a:pos x="connsiteX27" y="connsiteY27"/>
+              </a:cxn>
+              <a:cxn ang="0">
+                <a:pos x="connsiteX28" y="connsiteY28"/>
+              </a:cxn>
+              <a:cxn ang="0">
+                <a:pos x="connsiteX29" y="connsiteY29"/>
+              </a:cxn>
+              <a:cxn ang="0">
+                <a:pos x="connsiteX30" y="connsiteY30"/>
+              </a:cxn>
+              <a:cxn ang="0">
+                <a:pos x="connsiteX31" y="connsiteY31"/>
+              </a:cxn>
+            </a:cxnLst>
+            <a:rect l="l" t="t" r="r" b="b"/>
+            <a:pathLst>
+              <a:path w="2771775" h="1143121">
+                <a:moveTo>
+                  <a:pt x="0" y="1128833"/>
+                </a:moveTo>
+                <a:cubicBezTo>
+                  <a:pt x="33337" y="1133596"/>
+                  <a:pt x="66336" y="1143121"/>
+                  <a:pt x="100012" y="1143121"/>
+                </a:cubicBezTo>
+                <a:cubicBezTo>
+                  <a:pt x="136386" y="1143121"/>
+                  <a:pt x="339131" y="1119727"/>
+                  <a:pt x="385762" y="1114546"/>
+                </a:cubicBezTo>
+                <a:cubicBezTo>
+                  <a:pt x="415143" y="1107200"/>
+                  <a:pt x="487134" y="1088239"/>
+                  <a:pt x="514350" y="1085971"/>
+                </a:cubicBezTo>
+                <a:cubicBezTo>
+                  <a:pt x="661783" y="1073685"/>
+                  <a:pt x="957262" y="1057396"/>
+                  <a:pt x="957262" y="1057396"/>
+                </a:cubicBezTo>
+                <a:cubicBezTo>
+                  <a:pt x="981075" y="1052633"/>
+                  <a:pt x="1005962" y="1051635"/>
+                  <a:pt x="1028700" y="1043108"/>
+                </a:cubicBezTo>
+                <a:cubicBezTo>
+                  <a:pt x="1073150" y="1026439"/>
+                  <a:pt x="1116012" y="966907"/>
+                  <a:pt x="1128712" y="928808"/>
+                </a:cubicBezTo>
+                <a:cubicBezTo>
+                  <a:pt x="1138237" y="900233"/>
+                  <a:pt x="1143817" y="870024"/>
+                  <a:pt x="1157287" y="843083"/>
+                </a:cubicBezTo>
+                <a:lnTo>
+                  <a:pt x="1185862" y="785933"/>
+                </a:lnTo>
+                <a:cubicBezTo>
+                  <a:pt x="1190625" y="762121"/>
+                  <a:pt x="1194882" y="738202"/>
+                  <a:pt x="1200150" y="714496"/>
+                </a:cubicBezTo>
+                <a:cubicBezTo>
+                  <a:pt x="1204410" y="695327"/>
+                  <a:pt x="1211842" y="676810"/>
+                  <a:pt x="1214437" y="657346"/>
+                </a:cubicBezTo>
+                <a:cubicBezTo>
+                  <a:pt x="1221389" y="605204"/>
+                  <a:pt x="1222200" y="552381"/>
+                  <a:pt x="1228725" y="500183"/>
+                </a:cubicBezTo>
+                <a:cubicBezTo>
+                  <a:pt x="1232000" y="473985"/>
+                  <a:pt x="1249141" y="400154"/>
+                  <a:pt x="1257300" y="371596"/>
+                </a:cubicBezTo>
+                <a:cubicBezTo>
+                  <a:pt x="1261437" y="357115"/>
+                  <a:pt x="1267624" y="343263"/>
+                  <a:pt x="1271587" y="328733"/>
+                </a:cubicBezTo>
+                <a:cubicBezTo>
+                  <a:pt x="1281920" y="290844"/>
+                  <a:pt x="1287743" y="251690"/>
+                  <a:pt x="1300162" y="214433"/>
+                </a:cubicBezTo>
+                <a:lnTo>
+                  <a:pt x="1343025" y="85846"/>
+                </a:lnTo>
+                <a:cubicBezTo>
+                  <a:pt x="1347788" y="71558"/>
+                  <a:pt x="1343024" y="47745"/>
+                  <a:pt x="1357312" y="42983"/>
+                </a:cubicBezTo>
+                <a:lnTo>
+                  <a:pt x="1400175" y="28696"/>
+                </a:lnTo>
+                <a:cubicBezTo>
+                  <a:pt x="1414462" y="19171"/>
+                  <a:pt x="1425904" y="1263"/>
+                  <a:pt x="1443037" y="121"/>
+                </a:cubicBezTo>
+                <a:cubicBezTo>
+                  <a:pt x="1472280" y="-1829"/>
+                  <a:pt x="1678413" y="20300"/>
+                  <a:pt x="1728787" y="28696"/>
+                </a:cubicBezTo>
+                <a:cubicBezTo>
+                  <a:pt x="1748156" y="31924"/>
+                  <a:pt x="1767129" y="37341"/>
+                  <a:pt x="1785937" y="42983"/>
+                </a:cubicBezTo>
+                <a:cubicBezTo>
+                  <a:pt x="1814787" y="51638"/>
+                  <a:pt x="1871662" y="71558"/>
+                  <a:pt x="1871662" y="71558"/>
+                </a:cubicBezTo>
+                <a:cubicBezTo>
+                  <a:pt x="1939588" y="116841"/>
+                  <a:pt x="1898233" y="94702"/>
+                  <a:pt x="2000250" y="128708"/>
+                </a:cubicBezTo>
+                <a:cubicBezTo>
+                  <a:pt x="2014537" y="133471"/>
+                  <a:pt x="2030581" y="134642"/>
+                  <a:pt x="2043112" y="142996"/>
+                </a:cubicBezTo>
+                <a:cubicBezTo>
+                  <a:pt x="2141368" y="208500"/>
+                  <a:pt x="2096256" y="189286"/>
+                  <a:pt x="2171700" y="214433"/>
+                </a:cubicBezTo>
+                <a:cubicBezTo>
+                  <a:pt x="2294535" y="296324"/>
+                  <a:pt x="2139120" y="198143"/>
+                  <a:pt x="2257425" y="257296"/>
+                </a:cubicBezTo>
+                <a:cubicBezTo>
+                  <a:pt x="2368205" y="312686"/>
+                  <a:pt x="2235419" y="264249"/>
+                  <a:pt x="2343150" y="300158"/>
+                </a:cubicBezTo>
+                <a:cubicBezTo>
+                  <a:pt x="2371725" y="319208"/>
+                  <a:pt x="2396294" y="346448"/>
+                  <a:pt x="2428875" y="357308"/>
+                </a:cubicBezTo>
+                <a:lnTo>
+                  <a:pt x="2514600" y="385883"/>
+                </a:lnTo>
+                <a:cubicBezTo>
+                  <a:pt x="2543175" y="404933"/>
+                  <a:pt x="2567745" y="432172"/>
+                  <a:pt x="2600325" y="443033"/>
+                </a:cubicBezTo>
+                <a:cubicBezTo>
+                  <a:pt x="2614612" y="447796"/>
+                  <a:pt x="2630022" y="450007"/>
+                  <a:pt x="2643187" y="457321"/>
+                </a:cubicBezTo>
+                <a:cubicBezTo>
+                  <a:pt x="2760321" y="522396"/>
+                  <a:pt x="2686448" y="514471"/>
+                  <a:pt x="2771775" y="514471"/>
+                </a:cubicBezTo>
+              </a:path>
+            </a:pathLst>
+          </a:custGeom>
+          <a:noFill/>
+        </p:spPr>
+        <p:style>
+          <a:lnRef idx="2">
+            <a:schemeClr val="accent1">
+              <a:shade val="50000"/>
+            </a:schemeClr>
+          </a:lnRef>
+          <a:fillRef idx="1">
+            <a:schemeClr val="accent1"/>
+          </a:fillRef>
+          <a:effectRef idx="0">
+            <a:schemeClr val="accent1"/>
+          </a:effectRef>
+          <a:fontRef idx="minor">
+            <a:schemeClr val="lt1"/>
+          </a:fontRef>
+        </p:style>
+        <p:txBody>
+          <a:bodyPr rtlCol="0" anchor="ctr"/>
+          <a:lstStyle/>
+          <a:p>
+            <a:pPr algn="ctr"/>
+            <a:endParaRPr lang="en-US"/>
+          </a:p>
+        </p:txBody>
+      </p:sp>
+      <p:sp>
+        <p:nvSpPr>
+          <p:cNvPr id="35" name="TextBox 34">
+            <a:extLst>
+              <a:ext uri="{FF2B5EF4-FFF2-40B4-BE49-F238E27FC236}">
+                <a16:creationId xmlns:a16="http://schemas.microsoft.com/office/drawing/2014/main" id="{A63762C4-76BB-E542-8CDF-4805B59C368E}"/>
+              </a:ext>
+            </a:extLst>
+          </p:cNvPr>
+          <p:cNvSpPr txBox="1"/>
+          <p:nvPr/>
+        </p:nvSpPr>
+        <p:spPr>
+          <a:xfrm>
+            <a:off x="5413166" y="109061"/>
+            <a:ext cx="2081980" cy="369332"/>
+          </a:xfrm>
+          <a:prstGeom prst="rect">
+            <a:avLst/>
+          </a:prstGeom>
+          <a:noFill/>
+        </p:spPr>
+        <p:txBody>
+          <a:bodyPr wrap="none" rtlCol="0">
+            <a:spAutoFit/>
+          </a:bodyPr>
+          <a:lstStyle/>
+          <a:p>
+            <a:r>
+              <a:rPr lang="en-US" dirty="0"/>
+              <a:t>Direction of sex-bias</a:t>
+            </a:r>
+          </a:p>
+        </p:txBody>
+      </p:sp>
+    </p:spTree>
+    <p:extLst>
+      <p:ext uri="{BB962C8B-B14F-4D97-AF65-F5344CB8AC3E}">
+        <p14:creationId xmlns:p14="http://schemas.microsoft.com/office/powerpoint/2010/main" val="3911471098"/>
+      </p:ext>
+    </p:extLst>
+  </p:cSld>
+  <p:clrMapOvr>
+    <a:masterClrMapping/>
+  </p:clrMapOvr>
+</p:sld>
+</file>
+
+<file path=ppt/slides/slide5.xml><?xml version="1.0" encoding="utf-8"?>
+<p:sld xmlns:a="http://schemas.openxmlformats.org/drawingml/2006/main" xmlns:r="http://schemas.openxmlformats.org/officeDocument/2006/relationships" xmlns:p="http://schemas.openxmlformats.org/presentationml/2006/main">
+  <p:cSld>
+    <p:spTree>
+      <p:nvGrpSpPr>
+        <p:cNvPr id="1" name=""/>
+        <p:cNvGrpSpPr/>
+        <p:nvPr/>
+      </p:nvGrpSpPr>
+      <p:grpSpPr>
+        <a:xfrm>
+          <a:off x="0" y="0"/>
+          <a:ext cx="0" cy="0"/>
+          <a:chOff x="0" y="0"/>
+          <a:chExt cx="0" cy="0"/>
+        </a:xfrm>
+      </p:grpSpPr>
+      <p:sp>
+        <p:nvSpPr>
+          <p:cNvPr id="2" name="Title 1">
+            <a:extLst>
+              <a:ext uri="{FF2B5EF4-FFF2-40B4-BE49-F238E27FC236}">
+                <a16:creationId xmlns:a16="http://schemas.microsoft.com/office/drawing/2014/main" id="{19349561-C4FC-F543-B3AA-0899E76E96E7}"/>
+              </a:ext>
+            </a:extLst>
+          </p:cNvPr>
+          <p:cNvSpPr>
+            <a:spLocks noGrp="1"/>
+          </p:cNvSpPr>
+          <p:nvPr>
+            <p:ph type="title"/>
+          </p:nvPr>
+        </p:nvSpPr>
+        <p:spPr/>
+        <p:txBody>
+          <a:bodyPr/>
+          <a:lstStyle/>
+          <a:p>
+            <a:endParaRPr lang="en-US"/>
+          </a:p>
+        </p:txBody>
+      </p:sp>
+      <p:sp>
+        <p:nvSpPr>
+          <p:cNvPr id="3" name="Content Placeholder 2">
+            <a:extLst>
+              <a:ext uri="{FF2B5EF4-FFF2-40B4-BE49-F238E27FC236}">
+                <a16:creationId xmlns:a16="http://schemas.microsoft.com/office/drawing/2014/main" id="{73DD463A-1BFC-DE4C-87A0-C3281922BB72}"/>
+              </a:ext>
+            </a:extLst>
+          </p:cNvPr>
+          <p:cNvSpPr>
+            <a:spLocks noGrp="1"/>
+          </p:cNvSpPr>
+          <p:nvPr>
+            <p:ph idx="1"/>
+          </p:nvPr>
+        </p:nvSpPr>
+        <p:spPr/>
+        <p:txBody>
+          <a:bodyPr/>
+          <a:lstStyle/>
+          <a:p>
+            <a:endParaRPr lang="en-US"/>
+          </a:p>
+        </p:txBody>
+      </p:sp>
+    </p:spTree>
+    <p:extLst>
+      <p:ext uri="{BB962C8B-B14F-4D97-AF65-F5344CB8AC3E}">
+        <p14:creationId xmlns:p14="http://schemas.microsoft.com/office/powerpoint/2010/main" val="912265673"/>
+      </p:ext>
+    </p:extLst>
+  </p:cSld>
+  <p:clrMapOvr>
+    <a:masterClrMapping/>
+  </p:clrMapOvr>
+</p:sld>
+</file>
+
 <file path=ppt/theme/theme1.xml><?xml version="1.0" encoding="utf-8"?>
 <a:theme xmlns:a="http://schemas.openxmlformats.org/drawingml/2006/main" name="Office Theme">
   <a:themeElements>

</xml_diff>